<commit_message>
add some on model selection
</commit_message>
<xml_diff>
--- a/07-linear/slides.pptx
+++ b/07-linear/slides.pptx
@@ -6,7 +6,7 @@
     <p:sldMasterId id="2147483649" r:id="rId2"/>
   </p:sldMasterIdLst>
   <p:notesMasterIdLst>
-    <p:notesMasterId r:id="rId43"/>
+    <p:notesMasterId r:id="rId52"/>
   </p:notesMasterIdLst>
   <p:sldIdLst>
     <p:sldId id="258" r:id="rId3"/>
@@ -48,7 +48,16 @@
     <p:sldId id="595" r:id="rId39"/>
     <p:sldId id="594" r:id="rId40"/>
     <p:sldId id="597" r:id="rId41"/>
-    <p:sldId id="600" r:id="rId42"/>
+    <p:sldId id="646" r:id="rId42"/>
+    <p:sldId id="647" r:id="rId43"/>
+    <p:sldId id="648" r:id="rId44"/>
+    <p:sldId id="649" r:id="rId45"/>
+    <p:sldId id="650" r:id="rId46"/>
+    <p:sldId id="651" r:id="rId47"/>
+    <p:sldId id="652" r:id="rId48"/>
+    <p:sldId id="653" r:id="rId49"/>
+    <p:sldId id="654" r:id="rId50"/>
+    <p:sldId id="600" r:id="rId51"/>
   </p:sldIdLst>
   <p:sldSz cx="9363075" cy="5257800"/>
   <p:notesSz cx="6858000" cy="9144000"/>
@@ -4372,7 +4381,33 @@
           <a:bodyPr/>
           <a:lstStyle/>
           <a:p>
-            <a:endParaRPr lang="en-US" baseline="0" dirty="0" smtClean="0"/>
+            <a:pPr marL="0" marR="0" indent="0" algn="l" defTabSz="457200" rtl="0" eaLnBrk="1" fontAlgn="auto" latinLnBrk="0" hangingPunct="1">
+              <a:lnSpc>
+                <a:spcPct val="100000"/>
+              </a:lnSpc>
+              <a:spcBef>
+                <a:spcPts val="0"/>
+              </a:spcBef>
+              <a:spcAft>
+                <a:spcPts val="0"/>
+              </a:spcAft>
+              <a:buClrTx/>
+              <a:buSzTx/>
+              <a:buFontTx/>
+              <a:buNone/>
+              <a:tabLst/>
+              <a:defRPr/>
+            </a:pPr>
+            <a:r>
+              <a:rPr lang="en-US" sz="1200" baseline="0" dirty="0" smtClean="0">
+                <a:solidFill>
+                  <a:prstClr val="black"/>
+                </a:solidFill>
+                <a:latin typeface="ArialMT"/>
+                <a:sym typeface="Wingdings"/>
+              </a:rPr>
+              <a:t> </a:t>
+            </a:r>
           </a:p>
         </p:txBody>
       </p:sp>
@@ -4394,6 +4429,970 @@
             <a:fld id="{ADD4B5B7-85EF-4E48-AC80-2380FACD9C23}" type="slidenum">
               <a:rPr lang="en-US" smtClean="0"/>
               <a:t>40</a:t>
+            </a:fld>
+            <a:endParaRPr lang="en-US"/>
+          </a:p>
+        </p:txBody>
+      </p:sp>
+    </p:spTree>
+    <p:extLst>
+      <p:ext uri="{BB962C8B-B14F-4D97-AF65-F5344CB8AC3E}">
+        <p14:creationId xmlns:p14="http://schemas.microsoft.com/office/powerpoint/2010/main" val="645762702"/>
+      </p:ext>
+    </p:extLst>
+  </p:cSld>
+  <p:clrMapOvr>
+    <a:masterClrMapping/>
+  </p:clrMapOvr>
+</p:notes>
+</file>
+
+<file path=ppt/notesSlides/notesSlide41.xml><?xml version="1.0" encoding="utf-8"?>
+<p:notes xmlns:a="http://schemas.openxmlformats.org/drawingml/2006/main" xmlns:r="http://schemas.openxmlformats.org/officeDocument/2006/relationships" xmlns:p="http://schemas.openxmlformats.org/presentationml/2006/main">
+  <p:cSld>
+    <p:spTree>
+      <p:nvGrpSpPr>
+        <p:cNvPr id="1" name=""/>
+        <p:cNvGrpSpPr/>
+        <p:nvPr/>
+      </p:nvGrpSpPr>
+      <p:grpSpPr>
+        <a:xfrm>
+          <a:off x="0" y="0"/>
+          <a:ext cx="0" cy="0"/>
+          <a:chOff x="0" y="0"/>
+          <a:chExt cx="0" cy="0"/>
+        </a:xfrm>
+      </p:grpSpPr>
+      <p:sp>
+        <p:nvSpPr>
+          <p:cNvPr id="2" name="Slide Image Placeholder 1"/>
+          <p:cNvSpPr>
+            <a:spLocks noGrp="1" noRot="1" noChangeAspect="1"/>
+          </p:cNvSpPr>
+          <p:nvPr>
+            <p:ph type="sldImg"/>
+          </p:nvPr>
+        </p:nvSpPr>
+        <p:spPr/>
+      </p:sp>
+      <p:sp>
+        <p:nvSpPr>
+          <p:cNvPr id="3" name="Notes Placeholder 2"/>
+          <p:cNvSpPr>
+            <a:spLocks noGrp="1"/>
+          </p:cNvSpPr>
+          <p:nvPr>
+            <p:ph type="body" idx="1"/>
+          </p:nvPr>
+        </p:nvSpPr>
+        <p:spPr/>
+        <p:txBody>
+          <a:bodyPr/>
+          <a:lstStyle/>
+          <a:p>
+            <a:pPr marL="0" marR="0" indent="0" algn="l" defTabSz="457200" rtl="0" eaLnBrk="1" fontAlgn="auto" latinLnBrk="0" hangingPunct="1">
+              <a:lnSpc>
+                <a:spcPct val="100000"/>
+              </a:lnSpc>
+              <a:spcBef>
+                <a:spcPts val="0"/>
+              </a:spcBef>
+              <a:spcAft>
+                <a:spcPts val="0"/>
+              </a:spcAft>
+              <a:buClrTx/>
+              <a:buSzTx/>
+              <a:buFontTx/>
+              <a:buNone/>
+              <a:tabLst/>
+              <a:defRPr/>
+            </a:pPr>
+            <a:r>
+              <a:rPr lang="en-US" sz="1200" baseline="0" dirty="0" smtClean="0">
+                <a:solidFill>
+                  <a:prstClr val="black"/>
+                </a:solidFill>
+                <a:latin typeface="ArialMT"/>
+                <a:sym typeface="Wingdings"/>
+              </a:rPr>
+              <a:t> </a:t>
+            </a:r>
+          </a:p>
+        </p:txBody>
+      </p:sp>
+      <p:sp>
+        <p:nvSpPr>
+          <p:cNvPr id="4" name="Slide Number Placeholder 3"/>
+          <p:cNvSpPr>
+            <a:spLocks noGrp="1"/>
+          </p:cNvSpPr>
+          <p:nvPr>
+            <p:ph type="sldNum" sz="quarter" idx="10"/>
+          </p:nvPr>
+        </p:nvSpPr>
+        <p:spPr/>
+        <p:txBody>
+          <a:bodyPr/>
+          <a:lstStyle/>
+          <a:p>
+            <a:fld id="{ADD4B5B7-85EF-4E48-AC80-2380FACD9C23}" type="slidenum">
+              <a:rPr lang="en-US" smtClean="0"/>
+              <a:t>41</a:t>
+            </a:fld>
+            <a:endParaRPr lang="en-US"/>
+          </a:p>
+        </p:txBody>
+      </p:sp>
+    </p:spTree>
+    <p:extLst>
+      <p:ext uri="{BB962C8B-B14F-4D97-AF65-F5344CB8AC3E}">
+        <p14:creationId xmlns:p14="http://schemas.microsoft.com/office/powerpoint/2010/main" val="645762702"/>
+      </p:ext>
+    </p:extLst>
+  </p:cSld>
+  <p:clrMapOvr>
+    <a:masterClrMapping/>
+  </p:clrMapOvr>
+</p:notes>
+</file>
+
+<file path=ppt/notesSlides/notesSlide42.xml><?xml version="1.0" encoding="utf-8"?>
+<p:notes xmlns:a="http://schemas.openxmlformats.org/drawingml/2006/main" xmlns:r="http://schemas.openxmlformats.org/officeDocument/2006/relationships" xmlns:p="http://schemas.openxmlformats.org/presentationml/2006/main">
+  <p:cSld>
+    <p:spTree>
+      <p:nvGrpSpPr>
+        <p:cNvPr id="1" name=""/>
+        <p:cNvGrpSpPr/>
+        <p:nvPr/>
+      </p:nvGrpSpPr>
+      <p:grpSpPr>
+        <a:xfrm>
+          <a:off x="0" y="0"/>
+          <a:ext cx="0" cy="0"/>
+          <a:chOff x="0" y="0"/>
+          <a:chExt cx="0" cy="0"/>
+        </a:xfrm>
+      </p:grpSpPr>
+      <p:sp>
+        <p:nvSpPr>
+          <p:cNvPr id="2" name="Slide Image Placeholder 1"/>
+          <p:cNvSpPr>
+            <a:spLocks noGrp="1" noRot="1" noChangeAspect="1"/>
+          </p:cNvSpPr>
+          <p:nvPr>
+            <p:ph type="sldImg"/>
+          </p:nvPr>
+        </p:nvSpPr>
+        <p:spPr/>
+      </p:sp>
+      <p:sp>
+        <p:nvSpPr>
+          <p:cNvPr id="3" name="Notes Placeholder 2"/>
+          <p:cNvSpPr>
+            <a:spLocks noGrp="1"/>
+          </p:cNvSpPr>
+          <p:nvPr>
+            <p:ph type="body" idx="1"/>
+          </p:nvPr>
+        </p:nvSpPr>
+        <p:spPr/>
+        <p:txBody>
+          <a:bodyPr/>
+          <a:lstStyle/>
+          <a:p>
+            <a:pPr marL="0" marR="0" indent="0" algn="l" defTabSz="457200" rtl="0" eaLnBrk="1" fontAlgn="auto" latinLnBrk="0" hangingPunct="1">
+              <a:lnSpc>
+                <a:spcPct val="100000"/>
+              </a:lnSpc>
+              <a:spcBef>
+                <a:spcPts val="0"/>
+              </a:spcBef>
+              <a:spcAft>
+                <a:spcPts val="0"/>
+              </a:spcAft>
+              <a:buClrTx/>
+              <a:buSzTx/>
+              <a:buFontTx/>
+              <a:buNone/>
+              <a:tabLst/>
+              <a:defRPr/>
+            </a:pPr>
+            <a:r>
+              <a:rPr lang="en-US" sz="1200" baseline="0" dirty="0" smtClean="0">
+                <a:solidFill>
+                  <a:prstClr val="black"/>
+                </a:solidFill>
+                <a:latin typeface="ArialMT"/>
+                <a:sym typeface="Wingdings"/>
+              </a:rPr>
+              <a:t> </a:t>
+            </a:r>
+          </a:p>
+        </p:txBody>
+      </p:sp>
+      <p:sp>
+        <p:nvSpPr>
+          <p:cNvPr id="4" name="Slide Number Placeholder 3"/>
+          <p:cNvSpPr>
+            <a:spLocks noGrp="1"/>
+          </p:cNvSpPr>
+          <p:nvPr>
+            <p:ph type="sldNum" sz="quarter" idx="10"/>
+          </p:nvPr>
+        </p:nvSpPr>
+        <p:spPr/>
+        <p:txBody>
+          <a:bodyPr/>
+          <a:lstStyle/>
+          <a:p>
+            <a:fld id="{ADD4B5B7-85EF-4E48-AC80-2380FACD9C23}" type="slidenum">
+              <a:rPr lang="en-US" smtClean="0"/>
+              <a:t>42</a:t>
+            </a:fld>
+            <a:endParaRPr lang="en-US"/>
+          </a:p>
+        </p:txBody>
+      </p:sp>
+    </p:spTree>
+    <p:extLst>
+      <p:ext uri="{BB962C8B-B14F-4D97-AF65-F5344CB8AC3E}">
+        <p14:creationId xmlns:p14="http://schemas.microsoft.com/office/powerpoint/2010/main" val="645762702"/>
+      </p:ext>
+    </p:extLst>
+  </p:cSld>
+  <p:clrMapOvr>
+    <a:masterClrMapping/>
+  </p:clrMapOvr>
+</p:notes>
+</file>
+
+<file path=ppt/notesSlides/notesSlide43.xml><?xml version="1.0" encoding="utf-8"?>
+<p:notes xmlns:a="http://schemas.openxmlformats.org/drawingml/2006/main" xmlns:r="http://schemas.openxmlformats.org/officeDocument/2006/relationships" xmlns:p="http://schemas.openxmlformats.org/presentationml/2006/main">
+  <p:cSld>
+    <p:spTree>
+      <p:nvGrpSpPr>
+        <p:cNvPr id="1" name=""/>
+        <p:cNvGrpSpPr/>
+        <p:nvPr/>
+      </p:nvGrpSpPr>
+      <p:grpSpPr>
+        <a:xfrm>
+          <a:off x="0" y="0"/>
+          <a:ext cx="0" cy="0"/>
+          <a:chOff x="0" y="0"/>
+          <a:chExt cx="0" cy="0"/>
+        </a:xfrm>
+      </p:grpSpPr>
+      <p:sp>
+        <p:nvSpPr>
+          <p:cNvPr id="2" name="Slide Image Placeholder 1"/>
+          <p:cNvSpPr>
+            <a:spLocks noGrp="1" noRot="1" noChangeAspect="1"/>
+          </p:cNvSpPr>
+          <p:nvPr>
+            <p:ph type="sldImg"/>
+          </p:nvPr>
+        </p:nvSpPr>
+        <p:spPr/>
+      </p:sp>
+      <p:sp>
+        <p:nvSpPr>
+          <p:cNvPr id="3" name="Notes Placeholder 2"/>
+          <p:cNvSpPr>
+            <a:spLocks noGrp="1"/>
+          </p:cNvSpPr>
+          <p:nvPr>
+            <p:ph type="body" idx="1"/>
+          </p:nvPr>
+        </p:nvSpPr>
+        <p:spPr/>
+        <p:txBody>
+          <a:bodyPr/>
+          <a:lstStyle/>
+          <a:p>
+            <a:pPr marL="0" marR="0" indent="0" algn="l" defTabSz="457200" rtl="0" eaLnBrk="1" fontAlgn="auto" latinLnBrk="0" hangingPunct="1">
+              <a:lnSpc>
+                <a:spcPct val="100000"/>
+              </a:lnSpc>
+              <a:spcBef>
+                <a:spcPts val="0"/>
+              </a:spcBef>
+              <a:spcAft>
+                <a:spcPts val="0"/>
+              </a:spcAft>
+              <a:buClrTx/>
+              <a:buSzTx/>
+              <a:buFontTx/>
+              <a:buNone/>
+              <a:tabLst/>
+              <a:defRPr/>
+            </a:pPr>
+            <a:r>
+              <a:rPr lang="en-US" sz="1200" baseline="0" dirty="0" smtClean="0">
+                <a:solidFill>
+                  <a:prstClr val="black"/>
+                </a:solidFill>
+                <a:latin typeface="ArialMT"/>
+                <a:sym typeface="Wingdings"/>
+              </a:rPr>
+              <a:t> </a:t>
+            </a:r>
+          </a:p>
+        </p:txBody>
+      </p:sp>
+      <p:sp>
+        <p:nvSpPr>
+          <p:cNvPr id="4" name="Slide Number Placeholder 3"/>
+          <p:cNvSpPr>
+            <a:spLocks noGrp="1"/>
+          </p:cNvSpPr>
+          <p:nvPr>
+            <p:ph type="sldNum" sz="quarter" idx="10"/>
+          </p:nvPr>
+        </p:nvSpPr>
+        <p:spPr/>
+        <p:txBody>
+          <a:bodyPr/>
+          <a:lstStyle/>
+          <a:p>
+            <a:fld id="{ADD4B5B7-85EF-4E48-AC80-2380FACD9C23}" type="slidenum">
+              <a:rPr lang="en-US" smtClean="0"/>
+              <a:t>43</a:t>
+            </a:fld>
+            <a:endParaRPr lang="en-US"/>
+          </a:p>
+        </p:txBody>
+      </p:sp>
+    </p:spTree>
+    <p:extLst>
+      <p:ext uri="{BB962C8B-B14F-4D97-AF65-F5344CB8AC3E}">
+        <p14:creationId xmlns:p14="http://schemas.microsoft.com/office/powerpoint/2010/main" val="645762702"/>
+      </p:ext>
+    </p:extLst>
+  </p:cSld>
+  <p:clrMapOvr>
+    <a:masterClrMapping/>
+  </p:clrMapOvr>
+</p:notes>
+</file>
+
+<file path=ppt/notesSlides/notesSlide44.xml><?xml version="1.0" encoding="utf-8"?>
+<p:notes xmlns:a="http://schemas.openxmlformats.org/drawingml/2006/main" xmlns:r="http://schemas.openxmlformats.org/officeDocument/2006/relationships" xmlns:p="http://schemas.openxmlformats.org/presentationml/2006/main">
+  <p:cSld>
+    <p:spTree>
+      <p:nvGrpSpPr>
+        <p:cNvPr id="1" name=""/>
+        <p:cNvGrpSpPr/>
+        <p:nvPr/>
+      </p:nvGrpSpPr>
+      <p:grpSpPr>
+        <a:xfrm>
+          <a:off x="0" y="0"/>
+          <a:ext cx="0" cy="0"/>
+          <a:chOff x="0" y="0"/>
+          <a:chExt cx="0" cy="0"/>
+        </a:xfrm>
+      </p:grpSpPr>
+      <p:sp>
+        <p:nvSpPr>
+          <p:cNvPr id="2" name="Slide Image Placeholder 1"/>
+          <p:cNvSpPr>
+            <a:spLocks noGrp="1" noRot="1" noChangeAspect="1"/>
+          </p:cNvSpPr>
+          <p:nvPr>
+            <p:ph type="sldImg"/>
+          </p:nvPr>
+        </p:nvSpPr>
+        <p:spPr/>
+      </p:sp>
+      <p:sp>
+        <p:nvSpPr>
+          <p:cNvPr id="3" name="Notes Placeholder 2"/>
+          <p:cNvSpPr>
+            <a:spLocks noGrp="1"/>
+          </p:cNvSpPr>
+          <p:nvPr>
+            <p:ph type="body" idx="1"/>
+          </p:nvPr>
+        </p:nvSpPr>
+        <p:spPr/>
+        <p:txBody>
+          <a:bodyPr/>
+          <a:lstStyle/>
+          <a:p>
+            <a:pPr marL="0" marR="0" indent="0" algn="l" defTabSz="457200" rtl="0" eaLnBrk="1" fontAlgn="auto" latinLnBrk="0" hangingPunct="1">
+              <a:lnSpc>
+                <a:spcPct val="100000"/>
+              </a:lnSpc>
+              <a:spcBef>
+                <a:spcPts val="0"/>
+              </a:spcBef>
+              <a:spcAft>
+                <a:spcPts val="0"/>
+              </a:spcAft>
+              <a:buClrTx/>
+              <a:buSzTx/>
+              <a:buFontTx/>
+              <a:buNone/>
+              <a:tabLst/>
+              <a:defRPr/>
+            </a:pPr>
+            <a:r>
+              <a:rPr lang="en-US" sz="1200" baseline="0" dirty="0" smtClean="0">
+                <a:solidFill>
+                  <a:prstClr val="black"/>
+                </a:solidFill>
+                <a:latin typeface="ArialMT"/>
+                <a:sym typeface="Wingdings"/>
+              </a:rPr>
+              <a:t> </a:t>
+            </a:r>
+          </a:p>
+        </p:txBody>
+      </p:sp>
+      <p:sp>
+        <p:nvSpPr>
+          <p:cNvPr id="4" name="Slide Number Placeholder 3"/>
+          <p:cNvSpPr>
+            <a:spLocks noGrp="1"/>
+          </p:cNvSpPr>
+          <p:nvPr>
+            <p:ph type="sldNum" sz="quarter" idx="10"/>
+          </p:nvPr>
+        </p:nvSpPr>
+        <p:spPr/>
+        <p:txBody>
+          <a:bodyPr/>
+          <a:lstStyle/>
+          <a:p>
+            <a:fld id="{ADD4B5B7-85EF-4E48-AC80-2380FACD9C23}" type="slidenum">
+              <a:rPr lang="en-US" smtClean="0"/>
+              <a:t>44</a:t>
+            </a:fld>
+            <a:endParaRPr lang="en-US"/>
+          </a:p>
+        </p:txBody>
+      </p:sp>
+    </p:spTree>
+    <p:extLst>
+      <p:ext uri="{BB962C8B-B14F-4D97-AF65-F5344CB8AC3E}">
+        <p14:creationId xmlns:p14="http://schemas.microsoft.com/office/powerpoint/2010/main" val="645762702"/>
+      </p:ext>
+    </p:extLst>
+  </p:cSld>
+  <p:clrMapOvr>
+    <a:masterClrMapping/>
+  </p:clrMapOvr>
+</p:notes>
+</file>
+
+<file path=ppt/notesSlides/notesSlide45.xml><?xml version="1.0" encoding="utf-8"?>
+<p:notes xmlns:a="http://schemas.openxmlformats.org/drawingml/2006/main" xmlns:r="http://schemas.openxmlformats.org/officeDocument/2006/relationships" xmlns:p="http://schemas.openxmlformats.org/presentationml/2006/main">
+  <p:cSld>
+    <p:spTree>
+      <p:nvGrpSpPr>
+        <p:cNvPr id="1" name=""/>
+        <p:cNvGrpSpPr/>
+        <p:nvPr/>
+      </p:nvGrpSpPr>
+      <p:grpSpPr>
+        <a:xfrm>
+          <a:off x="0" y="0"/>
+          <a:ext cx="0" cy="0"/>
+          <a:chOff x="0" y="0"/>
+          <a:chExt cx="0" cy="0"/>
+        </a:xfrm>
+      </p:grpSpPr>
+      <p:sp>
+        <p:nvSpPr>
+          <p:cNvPr id="2" name="Slide Image Placeholder 1"/>
+          <p:cNvSpPr>
+            <a:spLocks noGrp="1" noRot="1" noChangeAspect="1"/>
+          </p:cNvSpPr>
+          <p:nvPr>
+            <p:ph type="sldImg"/>
+          </p:nvPr>
+        </p:nvSpPr>
+        <p:spPr/>
+      </p:sp>
+      <p:sp>
+        <p:nvSpPr>
+          <p:cNvPr id="3" name="Notes Placeholder 2"/>
+          <p:cNvSpPr>
+            <a:spLocks noGrp="1"/>
+          </p:cNvSpPr>
+          <p:nvPr>
+            <p:ph type="body" idx="1"/>
+          </p:nvPr>
+        </p:nvSpPr>
+        <p:spPr/>
+        <p:txBody>
+          <a:bodyPr/>
+          <a:lstStyle/>
+          <a:p>
+            <a:pPr marL="0" marR="0" indent="0" algn="l" defTabSz="457200" rtl="0" eaLnBrk="1" fontAlgn="auto" latinLnBrk="0" hangingPunct="1">
+              <a:lnSpc>
+                <a:spcPct val="100000"/>
+              </a:lnSpc>
+              <a:spcBef>
+                <a:spcPts val="0"/>
+              </a:spcBef>
+              <a:spcAft>
+                <a:spcPts val="0"/>
+              </a:spcAft>
+              <a:buClrTx/>
+              <a:buSzTx/>
+              <a:buFontTx/>
+              <a:buNone/>
+              <a:tabLst/>
+              <a:defRPr/>
+            </a:pPr>
+            <a:r>
+              <a:rPr lang="en-US" sz="1200" baseline="0" dirty="0" smtClean="0">
+                <a:solidFill>
+                  <a:prstClr val="black"/>
+                </a:solidFill>
+                <a:latin typeface="ArialMT"/>
+                <a:sym typeface="Wingdings"/>
+              </a:rPr>
+              <a:t> </a:t>
+            </a:r>
+          </a:p>
+        </p:txBody>
+      </p:sp>
+      <p:sp>
+        <p:nvSpPr>
+          <p:cNvPr id="4" name="Slide Number Placeholder 3"/>
+          <p:cNvSpPr>
+            <a:spLocks noGrp="1"/>
+          </p:cNvSpPr>
+          <p:nvPr>
+            <p:ph type="sldNum" sz="quarter" idx="10"/>
+          </p:nvPr>
+        </p:nvSpPr>
+        <p:spPr/>
+        <p:txBody>
+          <a:bodyPr/>
+          <a:lstStyle/>
+          <a:p>
+            <a:fld id="{ADD4B5B7-85EF-4E48-AC80-2380FACD9C23}" type="slidenum">
+              <a:rPr lang="en-US" smtClean="0"/>
+              <a:t>45</a:t>
+            </a:fld>
+            <a:endParaRPr lang="en-US"/>
+          </a:p>
+        </p:txBody>
+      </p:sp>
+    </p:spTree>
+    <p:extLst>
+      <p:ext uri="{BB962C8B-B14F-4D97-AF65-F5344CB8AC3E}">
+        <p14:creationId xmlns:p14="http://schemas.microsoft.com/office/powerpoint/2010/main" val="645762702"/>
+      </p:ext>
+    </p:extLst>
+  </p:cSld>
+  <p:clrMapOvr>
+    <a:masterClrMapping/>
+  </p:clrMapOvr>
+</p:notes>
+</file>
+
+<file path=ppt/notesSlides/notesSlide46.xml><?xml version="1.0" encoding="utf-8"?>
+<p:notes xmlns:a="http://schemas.openxmlformats.org/drawingml/2006/main" xmlns:r="http://schemas.openxmlformats.org/officeDocument/2006/relationships" xmlns:p="http://schemas.openxmlformats.org/presentationml/2006/main">
+  <p:cSld>
+    <p:spTree>
+      <p:nvGrpSpPr>
+        <p:cNvPr id="1" name=""/>
+        <p:cNvGrpSpPr/>
+        <p:nvPr/>
+      </p:nvGrpSpPr>
+      <p:grpSpPr>
+        <a:xfrm>
+          <a:off x="0" y="0"/>
+          <a:ext cx="0" cy="0"/>
+          <a:chOff x="0" y="0"/>
+          <a:chExt cx="0" cy="0"/>
+        </a:xfrm>
+      </p:grpSpPr>
+      <p:sp>
+        <p:nvSpPr>
+          <p:cNvPr id="2" name="Slide Image Placeholder 1"/>
+          <p:cNvSpPr>
+            <a:spLocks noGrp="1" noRot="1" noChangeAspect="1"/>
+          </p:cNvSpPr>
+          <p:nvPr>
+            <p:ph type="sldImg"/>
+          </p:nvPr>
+        </p:nvSpPr>
+        <p:spPr/>
+      </p:sp>
+      <p:sp>
+        <p:nvSpPr>
+          <p:cNvPr id="3" name="Notes Placeholder 2"/>
+          <p:cNvSpPr>
+            <a:spLocks noGrp="1"/>
+          </p:cNvSpPr>
+          <p:nvPr>
+            <p:ph type="body" idx="1"/>
+          </p:nvPr>
+        </p:nvSpPr>
+        <p:spPr/>
+        <p:txBody>
+          <a:bodyPr/>
+          <a:lstStyle/>
+          <a:p>
+            <a:pPr marL="0" marR="0" indent="0" algn="l" defTabSz="457200" rtl="0" eaLnBrk="1" fontAlgn="auto" latinLnBrk="0" hangingPunct="1">
+              <a:lnSpc>
+                <a:spcPct val="100000"/>
+              </a:lnSpc>
+              <a:spcBef>
+                <a:spcPts val="0"/>
+              </a:spcBef>
+              <a:spcAft>
+                <a:spcPts val="0"/>
+              </a:spcAft>
+              <a:buClrTx/>
+              <a:buSzTx/>
+              <a:buFontTx/>
+              <a:buNone/>
+              <a:tabLst/>
+              <a:defRPr/>
+            </a:pPr>
+            <a:r>
+              <a:rPr lang="en-US" sz="1200" baseline="0" dirty="0" smtClean="0">
+                <a:solidFill>
+                  <a:prstClr val="black"/>
+                </a:solidFill>
+                <a:latin typeface="ArialMT"/>
+                <a:sym typeface="Wingdings"/>
+              </a:rPr>
+              <a:t> </a:t>
+            </a:r>
+          </a:p>
+        </p:txBody>
+      </p:sp>
+      <p:sp>
+        <p:nvSpPr>
+          <p:cNvPr id="4" name="Slide Number Placeholder 3"/>
+          <p:cNvSpPr>
+            <a:spLocks noGrp="1"/>
+          </p:cNvSpPr>
+          <p:nvPr>
+            <p:ph type="sldNum" sz="quarter" idx="10"/>
+          </p:nvPr>
+        </p:nvSpPr>
+        <p:spPr/>
+        <p:txBody>
+          <a:bodyPr/>
+          <a:lstStyle/>
+          <a:p>
+            <a:fld id="{ADD4B5B7-85EF-4E48-AC80-2380FACD9C23}" type="slidenum">
+              <a:rPr lang="en-US" smtClean="0"/>
+              <a:t>46</a:t>
+            </a:fld>
+            <a:endParaRPr lang="en-US"/>
+          </a:p>
+        </p:txBody>
+      </p:sp>
+    </p:spTree>
+    <p:extLst>
+      <p:ext uri="{BB962C8B-B14F-4D97-AF65-F5344CB8AC3E}">
+        <p14:creationId xmlns:p14="http://schemas.microsoft.com/office/powerpoint/2010/main" val="645762702"/>
+      </p:ext>
+    </p:extLst>
+  </p:cSld>
+  <p:clrMapOvr>
+    <a:masterClrMapping/>
+  </p:clrMapOvr>
+</p:notes>
+</file>
+
+<file path=ppt/notesSlides/notesSlide47.xml><?xml version="1.0" encoding="utf-8"?>
+<p:notes xmlns:a="http://schemas.openxmlformats.org/drawingml/2006/main" xmlns:r="http://schemas.openxmlformats.org/officeDocument/2006/relationships" xmlns:p="http://schemas.openxmlformats.org/presentationml/2006/main">
+  <p:cSld>
+    <p:spTree>
+      <p:nvGrpSpPr>
+        <p:cNvPr id="1" name=""/>
+        <p:cNvGrpSpPr/>
+        <p:nvPr/>
+      </p:nvGrpSpPr>
+      <p:grpSpPr>
+        <a:xfrm>
+          <a:off x="0" y="0"/>
+          <a:ext cx="0" cy="0"/>
+          <a:chOff x="0" y="0"/>
+          <a:chExt cx="0" cy="0"/>
+        </a:xfrm>
+      </p:grpSpPr>
+      <p:sp>
+        <p:nvSpPr>
+          <p:cNvPr id="2" name="Slide Image Placeholder 1"/>
+          <p:cNvSpPr>
+            <a:spLocks noGrp="1" noRot="1" noChangeAspect="1"/>
+          </p:cNvSpPr>
+          <p:nvPr>
+            <p:ph type="sldImg"/>
+          </p:nvPr>
+        </p:nvSpPr>
+        <p:spPr/>
+      </p:sp>
+      <p:sp>
+        <p:nvSpPr>
+          <p:cNvPr id="3" name="Notes Placeholder 2"/>
+          <p:cNvSpPr>
+            <a:spLocks noGrp="1"/>
+          </p:cNvSpPr>
+          <p:nvPr>
+            <p:ph type="body" idx="1"/>
+          </p:nvPr>
+        </p:nvSpPr>
+        <p:spPr/>
+        <p:txBody>
+          <a:bodyPr/>
+          <a:lstStyle/>
+          <a:p>
+            <a:pPr marL="0" marR="0" indent="0" algn="l" defTabSz="457200" rtl="0" eaLnBrk="1" fontAlgn="auto" latinLnBrk="0" hangingPunct="1">
+              <a:lnSpc>
+                <a:spcPct val="100000"/>
+              </a:lnSpc>
+              <a:spcBef>
+                <a:spcPts val="0"/>
+              </a:spcBef>
+              <a:spcAft>
+                <a:spcPts val="0"/>
+              </a:spcAft>
+              <a:buClrTx/>
+              <a:buSzTx/>
+              <a:buFontTx/>
+              <a:buNone/>
+              <a:tabLst/>
+              <a:defRPr/>
+            </a:pPr>
+            <a:r>
+              <a:rPr lang="en-US" sz="1200" baseline="0" dirty="0" smtClean="0">
+                <a:solidFill>
+                  <a:prstClr val="black"/>
+                </a:solidFill>
+                <a:latin typeface="ArialMT"/>
+                <a:sym typeface="Wingdings"/>
+              </a:rPr>
+              <a:t> </a:t>
+            </a:r>
+          </a:p>
+        </p:txBody>
+      </p:sp>
+      <p:sp>
+        <p:nvSpPr>
+          <p:cNvPr id="4" name="Slide Number Placeholder 3"/>
+          <p:cNvSpPr>
+            <a:spLocks noGrp="1"/>
+          </p:cNvSpPr>
+          <p:nvPr>
+            <p:ph type="sldNum" sz="quarter" idx="10"/>
+          </p:nvPr>
+        </p:nvSpPr>
+        <p:spPr/>
+        <p:txBody>
+          <a:bodyPr/>
+          <a:lstStyle/>
+          <a:p>
+            <a:fld id="{ADD4B5B7-85EF-4E48-AC80-2380FACD9C23}" type="slidenum">
+              <a:rPr lang="en-US" smtClean="0"/>
+              <a:t>47</a:t>
+            </a:fld>
+            <a:endParaRPr lang="en-US"/>
+          </a:p>
+        </p:txBody>
+      </p:sp>
+    </p:spTree>
+    <p:extLst>
+      <p:ext uri="{BB962C8B-B14F-4D97-AF65-F5344CB8AC3E}">
+        <p14:creationId xmlns:p14="http://schemas.microsoft.com/office/powerpoint/2010/main" val="645762702"/>
+      </p:ext>
+    </p:extLst>
+  </p:cSld>
+  <p:clrMapOvr>
+    <a:masterClrMapping/>
+  </p:clrMapOvr>
+</p:notes>
+</file>
+
+<file path=ppt/notesSlides/notesSlide48.xml><?xml version="1.0" encoding="utf-8"?>
+<p:notes xmlns:a="http://schemas.openxmlformats.org/drawingml/2006/main" xmlns:r="http://schemas.openxmlformats.org/officeDocument/2006/relationships" xmlns:p="http://schemas.openxmlformats.org/presentationml/2006/main">
+  <p:cSld>
+    <p:spTree>
+      <p:nvGrpSpPr>
+        <p:cNvPr id="1" name=""/>
+        <p:cNvGrpSpPr/>
+        <p:nvPr/>
+      </p:nvGrpSpPr>
+      <p:grpSpPr>
+        <a:xfrm>
+          <a:off x="0" y="0"/>
+          <a:ext cx="0" cy="0"/>
+          <a:chOff x="0" y="0"/>
+          <a:chExt cx="0" cy="0"/>
+        </a:xfrm>
+      </p:grpSpPr>
+      <p:sp>
+        <p:nvSpPr>
+          <p:cNvPr id="2" name="Slide Image Placeholder 1"/>
+          <p:cNvSpPr>
+            <a:spLocks noGrp="1" noRot="1" noChangeAspect="1"/>
+          </p:cNvSpPr>
+          <p:nvPr>
+            <p:ph type="sldImg"/>
+          </p:nvPr>
+        </p:nvSpPr>
+        <p:spPr/>
+      </p:sp>
+      <p:sp>
+        <p:nvSpPr>
+          <p:cNvPr id="3" name="Notes Placeholder 2"/>
+          <p:cNvSpPr>
+            <a:spLocks noGrp="1"/>
+          </p:cNvSpPr>
+          <p:nvPr>
+            <p:ph type="body" idx="1"/>
+          </p:nvPr>
+        </p:nvSpPr>
+        <p:spPr/>
+        <p:txBody>
+          <a:bodyPr/>
+          <a:lstStyle/>
+          <a:p>
+            <a:pPr marL="0" marR="0" indent="0" algn="l" defTabSz="457200" rtl="0" eaLnBrk="1" fontAlgn="auto" latinLnBrk="0" hangingPunct="1">
+              <a:lnSpc>
+                <a:spcPct val="100000"/>
+              </a:lnSpc>
+              <a:spcBef>
+                <a:spcPts val="0"/>
+              </a:spcBef>
+              <a:spcAft>
+                <a:spcPts val="0"/>
+              </a:spcAft>
+              <a:buClrTx/>
+              <a:buSzTx/>
+              <a:buFontTx/>
+              <a:buNone/>
+              <a:tabLst/>
+              <a:defRPr/>
+            </a:pPr>
+            <a:r>
+              <a:rPr lang="en-US" sz="1200" baseline="0" dirty="0" smtClean="0">
+                <a:solidFill>
+                  <a:prstClr val="black"/>
+                </a:solidFill>
+                <a:latin typeface="ArialMT"/>
+                <a:sym typeface="Wingdings"/>
+              </a:rPr>
+              <a:t> </a:t>
+            </a:r>
+          </a:p>
+        </p:txBody>
+      </p:sp>
+      <p:sp>
+        <p:nvSpPr>
+          <p:cNvPr id="4" name="Slide Number Placeholder 3"/>
+          <p:cNvSpPr>
+            <a:spLocks noGrp="1"/>
+          </p:cNvSpPr>
+          <p:nvPr>
+            <p:ph type="sldNum" sz="quarter" idx="10"/>
+          </p:nvPr>
+        </p:nvSpPr>
+        <p:spPr/>
+        <p:txBody>
+          <a:bodyPr/>
+          <a:lstStyle/>
+          <a:p>
+            <a:fld id="{ADD4B5B7-85EF-4E48-AC80-2380FACD9C23}" type="slidenum">
+              <a:rPr lang="en-US" smtClean="0"/>
+              <a:t>48</a:t>
+            </a:fld>
+            <a:endParaRPr lang="en-US"/>
+          </a:p>
+        </p:txBody>
+      </p:sp>
+    </p:spTree>
+    <p:extLst>
+      <p:ext uri="{BB962C8B-B14F-4D97-AF65-F5344CB8AC3E}">
+        <p14:creationId xmlns:p14="http://schemas.microsoft.com/office/powerpoint/2010/main" val="645762702"/>
+      </p:ext>
+    </p:extLst>
+  </p:cSld>
+  <p:clrMapOvr>
+    <a:masterClrMapping/>
+  </p:clrMapOvr>
+</p:notes>
+</file>
+
+<file path=ppt/notesSlides/notesSlide49.xml><?xml version="1.0" encoding="utf-8"?>
+<p:notes xmlns:a="http://schemas.openxmlformats.org/drawingml/2006/main" xmlns:r="http://schemas.openxmlformats.org/officeDocument/2006/relationships" xmlns:p="http://schemas.openxmlformats.org/presentationml/2006/main">
+  <p:cSld>
+    <p:spTree>
+      <p:nvGrpSpPr>
+        <p:cNvPr id="1" name=""/>
+        <p:cNvGrpSpPr/>
+        <p:nvPr/>
+      </p:nvGrpSpPr>
+      <p:grpSpPr>
+        <a:xfrm>
+          <a:off x="0" y="0"/>
+          <a:ext cx="0" cy="0"/>
+          <a:chOff x="0" y="0"/>
+          <a:chExt cx="0" cy="0"/>
+        </a:xfrm>
+      </p:grpSpPr>
+      <p:sp>
+        <p:nvSpPr>
+          <p:cNvPr id="2" name="Slide Image Placeholder 1"/>
+          <p:cNvSpPr>
+            <a:spLocks noGrp="1" noRot="1" noChangeAspect="1"/>
+          </p:cNvSpPr>
+          <p:nvPr>
+            <p:ph type="sldImg"/>
+          </p:nvPr>
+        </p:nvSpPr>
+        <p:spPr/>
+      </p:sp>
+      <p:sp>
+        <p:nvSpPr>
+          <p:cNvPr id="3" name="Notes Placeholder 2"/>
+          <p:cNvSpPr>
+            <a:spLocks noGrp="1"/>
+          </p:cNvSpPr>
+          <p:nvPr>
+            <p:ph type="body" idx="1"/>
+          </p:nvPr>
+        </p:nvSpPr>
+        <p:spPr/>
+        <p:txBody>
+          <a:bodyPr/>
+          <a:lstStyle/>
+          <a:p>
+            <a:endParaRPr lang="en-US" baseline="0" dirty="0" smtClean="0"/>
+          </a:p>
+        </p:txBody>
+      </p:sp>
+      <p:sp>
+        <p:nvSpPr>
+          <p:cNvPr id="4" name="Slide Number Placeholder 3"/>
+          <p:cNvSpPr>
+            <a:spLocks noGrp="1"/>
+          </p:cNvSpPr>
+          <p:nvPr>
+            <p:ph type="sldNum" sz="quarter" idx="10"/>
+          </p:nvPr>
+        </p:nvSpPr>
+        <p:spPr/>
+        <p:txBody>
+          <a:bodyPr/>
+          <a:lstStyle/>
+          <a:p>
+            <a:fld id="{ADD4B5B7-85EF-4E48-AC80-2380FACD9C23}" type="slidenum">
+              <a:rPr lang="en-US" smtClean="0"/>
+              <a:t>49</a:t>
             </a:fld>
             <a:endParaRPr lang="en-US"/>
           </a:p>
@@ -20359,6 +21358,2002 @@
 </file>
 
 <file path=ppt/slides/slide40.xml><?xml version="1.0" encoding="utf-8"?>
+<p:sld xmlns:a="http://schemas.openxmlformats.org/drawingml/2006/main" xmlns:r="http://schemas.openxmlformats.org/officeDocument/2006/relationships" xmlns:p="http://schemas.openxmlformats.org/presentationml/2006/main">
+  <p:cSld>
+    <p:spTree>
+      <p:nvGrpSpPr>
+        <p:cNvPr id="1" name=""/>
+        <p:cNvGrpSpPr/>
+        <p:nvPr/>
+      </p:nvGrpSpPr>
+      <p:grpSpPr>
+        <a:xfrm>
+          <a:off x="0" y="0"/>
+          <a:ext cx="0" cy="0"/>
+          <a:chOff x="0" y="0"/>
+          <a:chExt cx="0" cy="0"/>
+        </a:xfrm>
+      </p:grpSpPr>
+      <p:sp>
+        <p:nvSpPr>
+          <p:cNvPr id="4" name="Content Placeholder 3"/>
+          <p:cNvSpPr>
+            <a:spLocks noGrp="1"/>
+          </p:cNvSpPr>
+          <p:nvPr>
+            <p:ph sz="quarter" idx="11"/>
+          </p:nvPr>
+        </p:nvSpPr>
+        <p:spPr>
+          <a:xfrm>
+            <a:off x="414337" y="495300"/>
+            <a:ext cx="6400800" cy="304800"/>
+          </a:xfrm>
+        </p:spPr>
+        <p:txBody>
+          <a:bodyPr/>
+          <a:lstStyle/>
+          <a:p>
+            <a:pPr eaLnBrk="1" hangingPunct="1">
+              <a:lnSpc>
+                <a:spcPts val="2448"/>
+              </a:lnSpc>
+              <a:defRPr/>
+            </a:pPr>
+            <a:r>
+              <a:rPr lang="en-US" dirty="0"/>
+              <a:t>Intro to regression</a:t>
+            </a:r>
+          </a:p>
+        </p:txBody>
+      </p:sp>
+      <p:sp>
+        <p:nvSpPr>
+          <p:cNvPr id="8" name="Slide Number Placeholder 3"/>
+          <p:cNvSpPr>
+            <a:spLocks noGrp="1"/>
+          </p:cNvSpPr>
+          <p:nvPr>
+            <p:ph type="sldNum" sz="quarter" idx="13"/>
+          </p:nvPr>
+        </p:nvSpPr>
+        <p:spPr/>
+        <p:txBody>
+          <a:bodyPr/>
+          <a:lstStyle/>
+          <a:p>
+            <a:pPr>
+              <a:defRPr/>
+            </a:pPr>
+            <a:fld id="{BD5AD749-DAD1-6A4A-A2AA-CB20EAD0AEB7}" type="slidenum">
+              <a:rPr lang="en-US"/>
+              <a:pPr>
+                <a:defRPr/>
+              </a:pPr>
+              <a:t>40</a:t>
+            </a:fld>
+            <a:endParaRPr lang="en-US"/>
+          </a:p>
+        </p:txBody>
+      </p:sp>
+      <p:sp>
+        <p:nvSpPr>
+          <p:cNvPr id="9" name="TextBox 8"/>
+          <p:cNvSpPr txBox="1"/>
+          <p:nvPr/>
+        </p:nvSpPr>
+        <p:spPr>
+          <a:xfrm>
+            <a:off x="566737" y="952500"/>
+            <a:ext cx="8382000" cy="1015663"/>
+          </a:xfrm>
+          <a:prstGeom prst="rect">
+            <a:avLst/>
+          </a:prstGeom>
+          <a:noFill/>
+        </p:spPr>
+        <p:txBody>
+          <a:bodyPr wrap="square" rtlCol="0">
+            <a:spAutoFit/>
+          </a:bodyPr>
+          <a:lstStyle/>
+          <a:p>
+            <a:pPr algn="l"/>
+            <a:r>
+              <a:rPr lang="en-US" sz="3000" dirty="0" smtClean="0">
+                <a:latin typeface="PFDinTextCompPro-Italic"/>
+                <a:cs typeface="PFDinTextCompPro-Italic"/>
+              </a:rPr>
+              <a:t>Q: </a:t>
+            </a:r>
+            <a:r>
+              <a:rPr lang="en-US" sz="3000" dirty="0" smtClean="0">
+                <a:latin typeface="PFDinTextCompPro-Italic"/>
+                <a:cs typeface="PFDinTextCompPro-Italic"/>
+              </a:rPr>
+              <a:t>So, how do we select</a:t>
+            </a:r>
+            <a:r>
+              <a:rPr lang="en-US" sz="3000" dirty="0" smtClean="0">
+                <a:latin typeface="PFDinTextCompPro-Italic"/>
+                <a:cs typeface="PFDinTextCompPro-Italic"/>
+              </a:rPr>
+              <a:t> </a:t>
+            </a:r>
+            <a:r>
+              <a:rPr lang="en-US" sz="3000" dirty="0" smtClean="0">
+                <a:latin typeface="PFDinTextCompPro-Italic"/>
+                <a:cs typeface="PFDinTextCompPro-Italic"/>
+              </a:rPr>
+              <a:t>a linear regression model?</a:t>
+            </a:r>
+            <a:endParaRPr lang="en-US" sz="3000" dirty="0" smtClean="0">
+              <a:latin typeface="PFDinTextCompPro-Italic"/>
+              <a:cs typeface="PFDinTextCompPro-Italic"/>
+            </a:endParaRPr>
+          </a:p>
+          <a:p>
+            <a:pPr marL="457200" indent="-457200" algn="l">
+              <a:buFont typeface="Arial"/>
+              <a:buChar char="•"/>
+            </a:pPr>
+            <a:endParaRPr lang="en-US" sz="3000" dirty="0">
+              <a:latin typeface="PFDinTextCompPro-Italic"/>
+              <a:cs typeface="PFDinTextCompPro-Italic"/>
+            </a:endParaRPr>
+          </a:p>
+        </p:txBody>
+      </p:sp>
+    </p:spTree>
+    <p:extLst>
+      <p:ext uri="{BB962C8B-B14F-4D97-AF65-F5344CB8AC3E}">
+        <p14:creationId xmlns:p14="http://schemas.microsoft.com/office/powerpoint/2010/main" val="1165243398"/>
+      </p:ext>
+    </p:extLst>
+  </p:cSld>
+  <p:clrMapOvr>
+    <a:masterClrMapping/>
+  </p:clrMapOvr>
+  <p:transition xmlns:p14="http://schemas.microsoft.com/office/powerpoint/2010/main"/>
+  <p:timing>
+    <p:tnLst>
+      <p:par>
+        <p:cTn xmlns:p14="http://schemas.microsoft.com/office/powerpoint/2010/main" id="1" dur="indefinite" restart="never" nodeType="tmRoot"/>
+      </p:par>
+    </p:tnLst>
+  </p:timing>
+</p:sld>
+</file>
+
+<file path=ppt/slides/slide41.xml><?xml version="1.0" encoding="utf-8"?>
+<p:sld xmlns:a="http://schemas.openxmlformats.org/drawingml/2006/main" xmlns:r="http://schemas.openxmlformats.org/officeDocument/2006/relationships" xmlns:p="http://schemas.openxmlformats.org/presentationml/2006/main">
+  <p:cSld>
+    <p:spTree>
+      <p:nvGrpSpPr>
+        <p:cNvPr id="1" name=""/>
+        <p:cNvGrpSpPr/>
+        <p:nvPr/>
+      </p:nvGrpSpPr>
+      <p:grpSpPr>
+        <a:xfrm>
+          <a:off x="0" y="0"/>
+          <a:ext cx="0" cy="0"/>
+          <a:chOff x="0" y="0"/>
+          <a:chExt cx="0" cy="0"/>
+        </a:xfrm>
+      </p:grpSpPr>
+      <p:sp>
+        <p:nvSpPr>
+          <p:cNvPr id="4" name="Content Placeholder 3"/>
+          <p:cNvSpPr>
+            <a:spLocks noGrp="1"/>
+          </p:cNvSpPr>
+          <p:nvPr>
+            <p:ph sz="quarter" idx="11"/>
+          </p:nvPr>
+        </p:nvSpPr>
+        <p:spPr>
+          <a:xfrm>
+            <a:off x="414337" y="495300"/>
+            <a:ext cx="6400800" cy="304800"/>
+          </a:xfrm>
+        </p:spPr>
+        <p:txBody>
+          <a:bodyPr/>
+          <a:lstStyle/>
+          <a:p>
+            <a:pPr eaLnBrk="1" hangingPunct="1">
+              <a:lnSpc>
+                <a:spcPts val="2448"/>
+              </a:lnSpc>
+              <a:defRPr/>
+            </a:pPr>
+            <a:r>
+              <a:rPr lang="en-US" dirty="0"/>
+              <a:t>Intro to regression</a:t>
+            </a:r>
+          </a:p>
+        </p:txBody>
+      </p:sp>
+      <p:sp>
+        <p:nvSpPr>
+          <p:cNvPr id="8" name="Slide Number Placeholder 3"/>
+          <p:cNvSpPr>
+            <a:spLocks noGrp="1"/>
+          </p:cNvSpPr>
+          <p:nvPr>
+            <p:ph type="sldNum" sz="quarter" idx="13"/>
+          </p:nvPr>
+        </p:nvSpPr>
+        <p:spPr/>
+        <p:txBody>
+          <a:bodyPr/>
+          <a:lstStyle/>
+          <a:p>
+            <a:pPr>
+              <a:defRPr/>
+            </a:pPr>
+            <a:fld id="{BD5AD749-DAD1-6A4A-A2AA-CB20EAD0AEB7}" type="slidenum">
+              <a:rPr lang="en-US"/>
+              <a:pPr>
+                <a:defRPr/>
+              </a:pPr>
+              <a:t>41</a:t>
+            </a:fld>
+            <a:endParaRPr lang="en-US"/>
+          </a:p>
+        </p:txBody>
+      </p:sp>
+      <p:sp>
+        <p:nvSpPr>
+          <p:cNvPr id="9" name="TextBox 8"/>
+          <p:cNvSpPr txBox="1"/>
+          <p:nvPr/>
+        </p:nvSpPr>
+        <p:spPr>
+          <a:xfrm>
+            <a:off x="566737" y="952500"/>
+            <a:ext cx="8382000" cy="1477328"/>
+          </a:xfrm>
+          <a:prstGeom prst="rect">
+            <a:avLst/>
+          </a:prstGeom>
+          <a:noFill/>
+        </p:spPr>
+        <p:txBody>
+          <a:bodyPr wrap="square" rtlCol="0">
+            <a:spAutoFit/>
+          </a:bodyPr>
+          <a:lstStyle/>
+          <a:p>
+            <a:pPr algn="l"/>
+            <a:r>
+              <a:rPr lang="en-US" sz="3000" dirty="0" smtClean="0">
+                <a:latin typeface="PFDinTextCompPro-Italic"/>
+                <a:cs typeface="PFDinTextCompPro-Italic"/>
+              </a:rPr>
+              <a:t>Q: </a:t>
+            </a:r>
+            <a:r>
+              <a:rPr lang="en-US" sz="3000" dirty="0" smtClean="0">
+                <a:latin typeface="PFDinTextCompPro-Italic"/>
+                <a:cs typeface="PFDinTextCompPro-Italic"/>
+              </a:rPr>
+              <a:t>So, how do we select</a:t>
+            </a:r>
+            <a:r>
+              <a:rPr lang="en-US" sz="3000" dirty="0" smtClean="0">
+                <a:latin typeface="PFDinTextCompPro-Italic"/>
+                <a:cs typeface="PFDinTextCompPro-Italic"/>
+              </a:rPr>
+              <a:t> </a:t>
+            </a:r>
+            <a:r>
+              <a:rPr lang="en-US" sz="3000" dirty="0" smtClean="0">
+                <a:latin typeface="PFDinTextCompPro-Italic"/>
+                <a:cs typeface="PFDinTextCompPro-Italic"/>
+              </a:rPr>
+              <a:t>a linear regression model?</a:t>
+            </a:r>
+            <a:endParaRPr lang="en-US" sz="3000" dirty="0" smtClean="0">
+              <a:latin typeface="PFDinTextCompPro-Italic"/>
+              <a:cs typeface="PFDinTextCompPro-Italic"/>
+            </a:endParaRPr>
+          </a:p>
+          <a:p>
+            <a:pPr marL="457200" indent="-457200" algn="l">
+              <a:buFont typeface="Arial"/>
+              <a:buChar char="•"/>
+            </a:pPr>
+            <a:r>
+              <a:rPr lang="en-US" sz="3000" dirty="0" smtClean="0">
+                <a:latin typeface="PFDinTextCompPro-Italic"/>
+                <a:cs typeface="PFDinTextCompPro-Italic"/>
+              </a:rPr>
+              <a:t>Techniques for producing designs</a:t>
+            </a:r>
+          </a:p>
+          <a:p>
+            <a:pPr marL="457200" indent="-457200" algn="l">
+              <a:buFont typeface="Arial"/>
+              <a:buChar char="•"/>
+            </a:pPr>
+            <a:endParaRPr lang="en-US" sz="3000" dirty="0">
+              <a:latin typeface="PFDinTextCompPro-Italic"/>
+              <a:cs typeface="PFDinTextCompPro-Italic"/>
+            </a:endParaRPr>
+          </a:p>
+        </p:txBody>
+      </p:sp>
+    </p:spTree>
+    <p:extLst>
+      <p:ext uri="{BB962C8B-B14F-4D97-AF65-F5344CB8AC3E}">
+        <p14:creationId xmlns:p14="http://schemas.microsoft.com/office/powerpoint/2010/main" val="2449941988"/>
+      </p:ext>
+    </p:extLst>
+  </p:cSld>
+  <p:clrMapOvr>
+    <a:masterClrMapping/>
+  </p:clrMapOvr>
+  <p:transition xmlns:p14="http://schemas.microsoft.com/office/powerpoint/2010/main"/>
+  <p:timing>
+    <p:tnLst>
+      <p:par>
+        <p:cTn xmlns:p14="http://schemas.microsoft.com/office/powerpoint/2010/main" id="1" dur="indefinite" restart="never" nodeType="tmRoot"/>
+      </p:par>
+    </p:tnLst>
+  </p:timing>
+</p:sld>
+</file>
+
+<file path=ppt/slides/slide42.xml><?xml version="1.0" encoding="utf-8"?>
+<p:sld xmlns:a="http://schemas.openxmlformats.org/drawingml/2006/main" xmlns:r="http://schemas.openxmlformats.org/officeDocument/2006/relationships" xmlns:p="http://schemas.openxmlformats.org/presentationml/2006/main">
+  <p:cSld>
+    <p:spTree>
+      <p:nvGrpSpPr>
+        <p:cNvPr id="1" name=""/>
+        <p:cNvGrpSpPr/>
+        <p:nvPr/>
+      </p:nvGrpSpPr>
+      <p:grpSpPr>
+        <a:xfrm>
+          <a:off x="0" y="0"/>
+          <a:ext cx="0" cy="0"/>
+          <a:chOff x="0" y="0"/>
+          <a:chExt cx="0" cy="0"/>
+        </a:xfrm>
+      </p:grpSpPr>
+      <p:sp>
+        <p:nvSpPr>
+          <p:cNvPr id="4" name="Content Placeholder 3"/>
+          <p:cNvSpPr>
+            <a:spLocks noGrp="1"/>
+          </p:cNvSpPr>
+          <p:nvPr>
+            <p:ph sz="quarter" idx="11"/>
+          </p:nvPr>
+        </p:nvSpPr>
+        <p:spPr>
+          <a:xfrm>
+            <a:off x="414337" y="495300"/>
+            <a:ext cx="6400800" cy="304800"/>
+          </a:xfrm>
+        </p:spPr>
+        <p:txBody>
+          <a:bodyPr/>
+          <a:lstStyle/>
+          <a:p>
+            <a:pPr eaLnBrk="1" hangingPunct="1">
+              <a:lnSpc>
+                <a:spcPts val="2448"/>
+              </a:lnSpc>
+              <a:defRPr/>
+            </a:pPr>
+            <a:r>
+              <a:rPr lang="en-US" dirty="0"/>
+              <a:t>Intro to regression</a:t>
+            </a:r>
+          </a:p>
+        </p:txBody>
+      </p:sp>
+      <p:sp>
+        <p:nvSpPr>
+          <p:cNvPr id="8" name="Slide Number Placeholder 3"/>
+          <p:cNvSpPr>
+            <a:spLocks noGrp="1"/>
+          </p:cNvSpPr>
+          <p:nvPr>
+            <p:ph type="sldNum" sz="quarter" idx="13"/>
+          </p:nvPr>
+        </p:nvSpPr>
+        <p:spPr/>
+        <p:txBody>
+          <a:bodyPr/>
+          <a:lstStyle/>
+          <a:p>
+            <a:pPr>
+              <a:defRPr/>
+            </a:pPr>
+            <a:fld id="{BD5AD749-DAD1-6A4A-A2AA-CB20EAD0AEB7}" type="slidenum">
+              <a:rPr lang="en-US"/>
+              <a:pPr>
+                <a:defRPr/>
+              </a:pPr>
+              <a:t>42</a:t>
+            </a:fld>
+            <a:endParaRPr lang="en-US"/>
+          </a:p>
+        </p:txBody>
+      </p:sp>
+      <p:sp>
+        <p:nvSpPr>
+          <p:cNvPr id="9" name="TextBox 8"/>
+          <p:cNvSpPr txBox="1"/>
+          <p:nvPr/>
+        </p:nvSpPr>
+        <p:spPr>
+          <a:xfrm>
+            <a:off x="566737" y="952500"/>
+            <a:ext cx="8382000" cy="1938992"/>
+          </a:xfrm>
+          <a:prstGeom prst="rect">
+            <a:avLst/>
+          </a:prstGeom>
+          <a:noFill/>
+        </p:spPr>
+        <p:txBody>
+          <a:bodyPr wrap="square" rtlCol="0">
+            <a:spAutoFit/>
+          </a:bodyPr>
+          <a:lstStyle/>
+          <a:p>
+            <a:pPr algn="l"/>
+            <a:r>
+              <a:rPr lang="en-US" sz="3000" dirty="0" smtClean="0">
+                <a:latin typeface="PFDinTextCompPro-Italic"/>
+                <a:cs typeface="PFDinTextCompPro-Italic"/>
+              </a:rPr>
+              <a:t>Q: </a:t>
+            </a:r>
+            <a:r>
+              <a:rPr lang="en-US" sz="3000" dirty="0" smtClean="0">
+                <a:latin typeface="PFDinTextCompPro-Italic"/>
+                <a:cs typeface="PFDinTextCompPro-Italic"/>
+              </a:rPr>
+              <a:t>So, how do we select</a:t>
+            </a:r>
+            <a:r>
+              <a:rPr lang="en-US" sz="3000" dirty="0" smtClean="0">
+                <a:latin typeface="PFDinTextCompPro-Italic"/>
+                <a:cs typeface="PFDinTextCompPro-Italic"/>
+              </a:rPr>
+              <a:t> </a:t>
+            </a:r>
+            <a:r>
+              <a:rPr lang="en-US" sz="3000" dirty="0" smtClean="0">
+                <a:latin typeface="PFDinTextCompPro-Italic"/>
+                <a:cs typeface="PFDinTextCompPro-Italic"/>
+              </a:rPr>
+              <a:t>a linear regression model?</a:t>
+            </a:r>
+            <a:endParaRPr lang="en-US" sz="3000" dirty="0" smtClean="0">
+              <a:latin typeface="PFDinTextCompPro-Italic"/>
+              <a:cs typeface="PFDinTextCompPro-Italic"/>
+            </a:endParaRPr>
+          </a:p>
+          <a:p>
+            <a:pPr marL="457200" indent="-457200" algn="l">
+              <a:buFont typeface="Arial"/>
+              <a:buChar char="•"/>
+            </a:pPr>
+            <a:r>
+              <a:rPr lang="en-US" sz="3000" dirty="0" smtClean="0">
+                <a:latin typeface="PFDinTextCompPro-Italic"/>
+                <a:cs typeface="PFDinTextCompPro-Italic"/>
+              </a:rPr>
+              <a:t>Techniques for producing designs</a:t>
+            </a:r>
+          </a:p>
+          <a:p>
+            <a:pPr marL="785813" lvl="1" indent="-457200" algn="l">
+              <a:buFont typeface="Arial"/>
+              <a:buChar char="•"/>
+            </a:pPr>
+            <a:r>
+              <a:rPr lang="en-US" sz="3000" dirty="0" smtClean="0">
+                <a:latin typeface="PFDinTextCompPro-Italic"/>
+                <a:cs typeface="PFDinTextCompPro-Italic"/>
+              </a:rPr>
+              <a:t>Theory</a:t>
+            </a:r>
+          </a:p>
+          <a:p>
+            <a:pPr marL="457200" indent="-457200" algn="l">
+              <a:buFont typeface="Arial"/>
+              <a:buChar char="•"/>
+            </a:pPr>
+            <a:endParaRPr lang="en-US" sz="3000" dirty="0">
+              <a:latin typeface="PFDinTextCompPro-Italic"/>
+              <a:cs typeface="PFDinTextCompPro-Italic"/>
+            </a:endParaRPr>
+          </a:p>
+        </p:txBody>
+      </p:sp>
+    </p:spTree>
+    <p:extLst>
+      <p:ext uri="{BB962C8B-B14F-4D97-AF65-F5344CB8AC3E}">
+        <p14:creationId xmlns:p14="http://schemas.microsoft.com/office/powerpoint/2010/main" val="2449941988"/>
+      </p:ext>
+    </p:extLst>
+  </p:cSld>
+  <p:clrMapOvr>
+    <a:masterClrMapping/>
+  </p:clrMapOvr>
+  <p:transition xmlns:p14="http://schemas.microsoft.com/office/powerpoint/2010/main"/>
+  <p:timing>
+    <p:tnLst>
+      <p:par>
+        <p:cTn xmlns:p14="http://schemas.microsoft.com/office/powerpoint/2010/main" id="1" dur="indefinite" restart="never" nodeType="tmRoot"/>
+      </p:par>
+    </p:tnLst>
+  </p:timing>
+</p:sld>
+</file>
+
+<file path=ppt/slides/slide43.xml><?xml version="1.0" encoding="utf-8"?>
+<p:sld xmlns:a="http://schemas.openxmlformats.org/drawingml/2006/main" xmlns:r="http://schemas.openxmlformats.org/officeDocument/2006/relationships" xmlns:p="http://schemas.openxmlformats.org/presentationml/2006/main">
+  <p:cSld>
+    <p:spTree>
+      <p:nvGrpSpPr>
+        <p:cNvPr id="1" name=""/>
+        <p:cNvGrpSpPr/>
+        <p:nvPr/>
+      </p:nvGrpSpPr>
+      <p:grpSpPr>
+        <a:xfrm>
+          <a:off x="0" y="0"/>
+          <a:ext cx="0" cy="0"/>
+          <a:chOff x="0" y="0"/>
+          <a:chExt cx="0" cy="0"/>
+        </a:xfrm>
+      </p:grpSpPr>
+      <p:sp>
+        <p:nvSpPr>
+          <p:cNvPr id="4" name="Content Placeholder 3"/>
+          <p:cNvSpPr>
+            <a:spLocks noGrp="1"/>
+          </p:cNvSpPr>
+          <p:nvPr>
+            <p:ph sz="quarter" idx="11"/>
+          </p:nvPr>
+        </p:nvSpPr>
+        <p:spPr>
+          <a:xfrm>
+            <a:off x="414337" y="495300"/>
+            <a:ext cx="6400800" cy="304800"/>
+          </a:xfrm>
+        </p:spPr>
+        <p:txBody>
+          <a:bodyPr/>
+          <a:lstStyle/>
+          <a:p>
+            <a:pPr eaLnBrk="1" hangingPunct="1">
+              <a:lnSpc>
+                <a:spcPts val="2448"/>
+              </a:lnSpc>
+              <a:defRPr/>
+            </a:pPr>
+            <a:r>
+              <a:rPr lang="en-US" dirty="0"/>
+              <a:t>Intro to regression</a:t>
+            </a:r>
+          </a:p>
+        </p:txBody>
+      </p:sp>
+      <p:sp>
+        <p:nvSpPr>
+          <p:cNvPr id="8" name="Slide Number Placeholder 3"/>
+          <p:cNvSpPr>
+            <a:spLocks noGrp="1"/>
+          </p:cNvSpPr>
+          <p:nvPr>
+            <p:ph type="sldNum" sz="quarter" idx="13"/>
+          </p:nvPr>
+        </p:nvSpPr>
+        <p:spPr/>
+        <p:txBody>
+          <a:bodyPr/>
+          <a:lstStyle/>
+          <a:p>
+            <a:pPr>
+              <a:defRPr/>
+            </a:pPr>
+            <a:fld id="{BD5AD749-DAD1-6A4A-A2AA-CB20EAD0AEB7}" type="slidenum">
+              <a:rPr lang="en-US"/>
+              <a:pPr>
+                <a:defRPr/>
+              </a:pPr>
+              <a:t>43</a:t>
+            </a:fld>
+            <a:endParaRPr lang="en-US"/>
+          </a:p>
+        </p:txBody>
+      </p:sp>
+      <p:sp>
+        <p:nvSpPr>
+          <p:cNvPr id="9" name="TextBox 8"/>
+          <p:cNvSpPr txBox="1"/>
+          <p:nvPr/>
+        </p:nvSpPr>
+        <p:spPr>
+          <a:xfrm>
+            <a:off x="566737" y="952500"/>
+            <a:ext cx="8382000" cy="2400657"/>
+          </a:xfrm>
+          <a:prstGeom prst="rect">
+            <a:avLst/>
+          </a:prstGeom>
+          <a:noFill/>
+        </p:spPr>
+        <p:txBody>
+          <a:bodyPr wrap="square" rtlCol="0">
+            <a:spAutoFit/>
+          </a:bodyPr>
+          <a:lstStyle/>
+          <a:p>
+            <a:pPr algn="l"/>
+            <a:r>
+              <a:rPr lang="en-US" sz="3000" dirty="0" smtClean="0">
+                <a:latin typeface="PFDinTextCompPro-Italic"/>
+                <a:cs typeface="PFDinTextCompPro-Italic"/>
+              </a:rPr>
+              <a:t>Q: </a:t>
+            </a:r>
+            <a:r>
+              <a:rPr lang="en-US" sz="3000" dirty="0" smtClean="0">
+                <a:latin typeface="PFDinTextCompPro-Italic"/>
+                <a:cs typeface="PFDinTextCompPro-Italic"/>
+              </a:rPr>
+              <a:t>So, how do we select</a:t>
+            </a:r>
+            <a:r>
+              <a:rPr lang="en-US" sz="3000" dirty="0" smtClean="0">
+                <a:latin typeface="PFDinTextCompPro-Italic"/>
+                <a:cs typeface="PFDinTextCompPro-Italic"/>
+              </a:rPr>
+              <a:t> </a:t>
+            </a:r>
+            <a:r>
+              <a:rPr lang="en-US" sz="3000" dirty="0" smtClean="0">
+                <a:latin typeface="PFDinTextCompPro-Italic"/>
+                <a:cs typeface="PFDinTextCompPro-Italic"/>
+              </a:rPr>
+              <a:t>a linear regression model?</a:t>
+            </a:r>
+            <a:endParaRPr lang="en-US" sz="3000" dirty="0" smtClean="0">
+              <a:latin typeface="PFDinTextCompPro-Italic"/>
+              <a:cs typeface="PFDinTextCompPro-Italic"/>
+            </a:endParaRPr>
+          </a:p>
+          <a:p>
+            <a:pPr marL="457200" indent="-457200" algn="l">
+              <a:buFont typeface="Arial"/>
+              <a:buChar char="•"/>
+            </a:pPr>
+            <a:r>
+              <a:rPr lang="en-US" sz="3000" dirty="0" smtClean="0">
+                <a:latin typeface="PFDinTextCompPro-Italic"/>
+                <a:cs typeface="PFDinTextCompPro-Italic"/>
+              </a:rPr>
+              <a:t>Techniques for producing designs</a:t>
+            </a:r>
+          </a:p>
+          <a:p>
+            <a:pPr marL="785813" lvl="1" indent="-457200" algn="l">
+              <a:buFont typeface="Arial"/>
+              <a:buChar char="•"/>
+            </a:pPr>
+            <a:r>
+              <a:rPr lang="en-US" sz="3000" dirty="0" smtClean="0">
+                <a:latin typeface="PFDinTextCompPro-Italic"/>
+                <a:cs typeface="PFDinTextCompPro-Italic"/>
+              </a:rPr>
+              <a:t>Theory</a:t>
+            </a:r>
+          </a:p>
+          <a:p>
+            <a:pPr marL="785813" lvl="1" indent="-457200" algn="l">
+              <a:buFont typeface="Arial"/>
+              <a:buChar char="•"/>
+            </a:pPr>
+            <a:r>
+              <a:rPr lang="en-US" sz="3000" dirty="0" smtClean="0">
+                <a:latin typeface="PFDinTextCompPro-Italic"/>
+                <a:cs typeface="PFDinTextCompPro-Italic"/>
+              </a:rPr>
+              <a:t>Forward selection</a:t>
+            </a:r>
+          </a:p>
+          <a:p>
+            <a:pPr marL="457200" indent="-457200" algn="l">
+              <a:buFont typeface="Arial"/>
+              <a:buChar char="•"/>
+            </a:pPr>
+            <a:endParaRPr lang="en-US" sz="3000" dirty="0">
+              <a:latin typeface="PFDinTextCompPro-Italic"/>
+              <a:cs typeface="PFDinTextCompPro-Italic"/>
+            </a:endParaRPr>
+          </a:p>
+        </p:txBody>
+      </p:sp>
+    </p:spTree>
+    <p:extLst>
+      <p:ext uri="{BB962C8B-B14F-4D97-AF65-F5344CB8AC3E}">
+        <p14:creationId xmlns:p14="http://schemas.microsoft.com/office/powerpoint/2010/main" val="2449941988"/>
+      </p:ext>
+    </p:extLst>
+  </p:cSld>
+  <p:clrMapOvr>
+    <a:masterClrMapping/>
+  </p:clrMapOvr>
+  <p:transition xmlns:p14="http://schemas.microsoft.com/office/powerpoint/2010/main"/>
+  <p:timing>
+    <p:tnLst>
+      <p:par>
+        <p:cTn xmlns:p14="http://schemas.microsoft.com/office/powerpoint/2010/main" id="1" dur="indefinite" restart="never" nodeType="tmRoot"/>
+      </p:par>
+    </p:tnLst>
+  </p:timing>
+</p:sld>
+</file>
+
+<file path=ppt/slides/slide44.xml><?xml version="1.0" encoding="utf-8"?>
+<p:sld xmlns:a="http://schemas.openxmlformats.org/drawingml/2006/main" xmlns:r="http://schemas.openxmlformats.org/officeDocument/2006/relationships" xmlns:p="http://schemas.openxmlformats.org/presentationml/2006/main">
+  <p:cSld>
+    <p:spTree>
+      <p:nvGrpSpPr>
+        <p:cNvPr id="1" name=""/>
+        <p:cNvGrpSpPr/>
+        <p:nvPr/>
+      </p:nvGrpSpPr>
+      <p:grpSpPr>
+        <a:xfrm>
+          <a:off x="0" y="0"/>
+          <a:ext cx="0" cy="0"/>
+          <a:chOff x="0" y="0"/>
+          <a:chExt cx="0" cy="0"/>
+        </a:xfrm>
+      </p:grpSpPr>
+      <p:sp>
+        <p:nvSpPr>
+          <p:cNvPr id="4" name="Content Placeholder 3"/>
+          <p:cNvSpPr>
+            <a:spLocks noGrp="1"/>
+          </p:cNvSpPr>
+          <p:nvPr>
+            <p:ph sz="quarter" idx="11"/>
+          </p:nvPr>
+        </p:nvSpPr>
+        <p:spPr>
+          <a:xfrm>
+            <a:off x="414337" y="495300"/>
+            <a:ext cx="6400800" cy="304800"/>
+          </a:xfrm>
+        </p:spPr>
+        <p:txBody>
+          <a:bodyPr/>
+          <a:lstStyle/>
+          <a:p>
+            <a:pPr eaLnBrk="1" hangingPunct="1">
+              <a:lnSpc>
+                <a:spcPts val="2448"/>
+              </a:lnSpc>
+              <a:defRPr/>
+            </a:pPr>
+            <a:r>
+              <a:rPr lang="en-US" dirty="0"/>
+              <a:t>Intro to regression</a:t>
+            </a:r>
+          </a:p>
+        </p:txBody>
+      </p:sp>
+      <p:sp>
+        <p:nvSpPr>
+          <p:cNvPr id="8" name="Slide Number Placeholder 3"/>
+          <p:cNvSpPr>
+            <a:spLocks noGrp="1"/>
+          </p:cNvSpPr>
+          <p:nvPr>
+            <p:ph type="sldNum" sz="quarter" idx="13"/>
+          </p:nvPr>
+        </p:nvSpPr>
+        <p:spPr/>
+        <p:txBody>
+          <a:bodyPr/>
+          <a:lstStyle/>
+          <a:p>
+            <a:pPr>
+              <a:defRPr/>
+            </a:pPr>
+            <a:fld id="{BD5AD749-DAD1-6A4A-A2AA-CB20EAD0AEB7}" type="slidenum">
+              <a:rPr lang="en-US"/>
+              <a:pPr>
+                <a:defRPr/>
+              </a:pPr>
+              <a:t>44</a:t>
+            </a:fld>
+            <a:endParaRPr lang="en-US"/>
+          </a:p>
+        </p:txBody>
+      </p:sp>
+      <p:sp>
+        <p:nvSpPr>
+          <p:cNvPr id="9" name="TextBox 8"/>
+          <p:cNvSpPr txBox="1"/>
+          <p:nvPr/>
+        </p:nvSpPr>
+        <p:spPr>
+          <a:xfrm>
+            <a:off x="566737" y="952500"/>
+            <a:ext cx="8382000" cy="2862322"/>
+          </a:xfrm>
+          <a:prstGeom prst="rect">
+            <a:avLst/>
+          </a:prstGeom>
+          <a:noFill/>
+        </p:spPr>
+        <p:txBody>
+          <a:bodyPr wrap="square" rtlCol="0">
+            <a:spAutoFit/>
+          </a:bodyPr>
+          <a:lstStyle/>
+          <a:p>
+            <a:pPr algn="l"/>
+            <a:r>
+              <a:rPr lang="en-US" sz="3000" dirty="0" smtClean="0">
+                <a:latin typeface="PFDinTextCompPro-Italic"/>
+                <a:cs typeface="PFDinTextCompPro-Italic"/>
+              </a:rPr>
+              <a:t>Q: </a:t>
+            </a:r>
+            <a:r>
+              <a:rPr lang="en-US" sz="3000" dirty="0" smtClean="0">
+                <a:latin typeface="PFDinTextCompPro-Italic"/>
+                <a:cs typeface="PFDinTextCompPro-Italic"/>
+              </a:rPr>
+              <a:t>So, how do we select</a:t>
+            </a:r>
+            <a:r>
+              <a:rPr lang="en-US" sz="3000" dirty="0" smtClean="0">
+                <a:latin typeface="PFDinTextCompPro-Italic"/>
+                <a:cs typeface="PFDinTextCompPro-Italic"/>
+              </a:rPr>
+              <a:t> </a:t>
+            </a:r>
+            <a:r>
+              <a:rPr lang="en-US" sz="3000" dirty="0" smtClean="0">
+                <a:latin typeface="PFDinTextCompPro-Italic"/>
+                <a:cs typeface="PFDinTextCompPro-Italic"/>
+              </a:rPr>
+              <a:t>a linear regression model?</a:t>
+            </a:r>
+            <a:endParaRPr lang="en-US" sz="3000" dirty="0" smtClean="0">
+              <a:latin typeface="PFDinTextCompPro-Italic"/>
+              <a:cs typeface="PFDinTextCompPro-Italic"/>
+            </a:endParaRPr>
+          </a:p>
+          <a:p>
+            <a:pPr marL="457200" indent="-457200" algn="l">
+              <a:buFont typeface="Arial"/>
+              <a:buChar char="•"/>
+            </a:pPr>
+            <a:r>
+              <a:rPr lang="en-US" sz="3000" dirty="0" smtClean="0">
+                <a:latin typeface="PFDinTextCompPro-Italic"/>
+                <a:cs typeface="PFDinTextCompPro-Italic"/>
+              </a:rPr>
+              <a:t>Techniques for producing designs</a:t>
+            </a:r>
+          </a:p>
+          <a:p>
+            <a:pPr marL="785813" lvl="1" indent="-457200" algn="l">
+              <a:buFont typeface="Arial"/>
+              <a:buChar char="•"/>
+            </a:pPr>
+            <a:r>
+              <a:rPr lang="en-US" sz="3000" dirty="0" smtClean="0">
+                <a:latin typeface="PFDinTextCompPro-Italic"/>
+                <a:cs typeface="PFDinTextCompPro-Italic"/>
+              </a:rPr>
+              <a:t>Theory</a:t>
+            </a:r>
+          </a:p>
+          <a:p>
+            <a:pPr marL="785813" lvl="1" indent="-457200" algn="l">
+              <a:buFont typeface="Arial"/>
+              <a:buChar char="•"/>
+            </a:pPr>
+            <a:r>
+              <a:rPr lang="en-US" sz="3000" dirty="0" smtClean="0">
+                <a:latin typeface="PFDinTextCompPro-Italic"/>
+                <a:cs typeface="PFDinTextCompPro-Italic"/>
+              </a:rPr>
+              <a:t>Forward selection</a:t>
+            </a:r>
+          </a:p>
+          <a:p>
+            <a:pPr marL="785813" lvl="1" indent="-457200" algn="l">
+              <a:buFont typeface="Arial"/>
+              <a:buChar char="•"/>
+            </a:pPr>
+            <a:r>
+              <a:rPr lang="en-US" sz="3000" dirty="0" smtClean="0">
+                <a:latin typeface="PFDinTextCompPro-Italic"/>
+                <a:cs typeface="PFDinTextCompPro-Italic"/>
+              </a:rPr>
+              <a:t>Backward elimination</a:t>
+            </a:r>
+          </a:p>
+          <a:p>
+            <a:pPr marL="457200" indent="-457200" algn="l">
+              <a:buFont typeface="Arial"/>
+              <a:buChar char="•"/>
+            </a:pPr>
+            <a:endParaRPr lang="en-US" sz="3000" dirty="0">
+              <a:latin typeface="PFDinTextCompPro-Italic"/>
+              <a:cs typeface="PFDinTextCompPro-Italic"/>
+            </a:endParaRPr>
+          </a:p>
+        </p:txBody>
+      </p:sp>
+    </p:spTree>
+    <p:extLst>
+      <p:ext uri="{BB962C8B-B14F-4D97-AF65-F5344CB8AC3E}">
+        <p14:creationId xmlns:p14="http://schemas.microsoft.com/office/powerpoint/2010/main" val="2449941988"/>
+      </p:ext>
+    </p:extLst>
+  </p:cSld>
+  <p:clrMapOvr>
+    <a:masterClrMapping/>
+  </p:clrMapOvr>
+  <p:transition xmlns:p14="http://schemas.microsoft.com/office/powerpoint/2010/main"/>
+  <p:timing>
+    <p:tnLst>
+      <p:par>
+        <p:cTn xmlns:p14="http://schemas.microsoft.com/office/powerpoint/2010/main" id="1" dur="indefinite" restart="never" nodeType="tmRoot"/>
+      </p:par>
+    </p:tnLst>
+  </p:timing>
+</p:sld>
+</file>
+
+<file path=ppt/slides/slide45.xml><?xml version="1.0" encoding="utf-8"?>
+<p:sld xmlns:a="http://schemas.openxmlformats.org/drawingml/2006/main" xmlns:r="http://schemas.openxmlformats.org/officeDocument/2006/relationships" xmlns:p="http://schemas.openxmlformats.org/presentationml/2006/main">
+  <p:cSld>
+    <p:spTree>
+      <p:nvGrpSpPr>
+        <p:cNvPr id="1" name=""/>
+        <p:cNvGrpSpPr/>
+        <p:nvPr/>
+      </p:nvGrpSpPr>
+      <p:grpSpPr>
+        <a:xfrm>
+          <a:off x="0" y="0"/>
+          <a:ext cx="0" cy="0"/>
+          <a:chOff x="0" y="0"/>
+          <a:chExt cx="0" cy="0"/>
+        </a:xfrm>
+      </p:grpSpPr>
+      <p:sp>
+        <p:nvSpPr>
+          <p:cNvPr id="4" name="Content Placeholder 3"/>
+          <p:cNvSpPr>
+            <a:spLocks noGrp="1"/>
+          </p:cNvSpPr>
+          <p:nvPr>
+            <p:ph sz="quarter" idx="11"/>
+          </p:nvPr>
+        </p:nvSpPr>
+        <p:spPr>
+          <a:xfrm>
+            <a:off x="414337" y="495300"/>
+            <a:ext cx="6400800" cy="304800"/>
+          </a:xfrm>
+        </p:spPr>
+        <p:txBody>
+          <a:bodyPr/>
+          <a:lstStyle/>
+          <a:p>
+            <a:pPr eaLnBrk="1" hangingPunct="1">
+              <a:lnSpc>
+                <a:spcPts val="2448"/>
+              </a:lnSpc>
+              <a:defRPr/>
+            </a:pPr>
+            <a:r>
+              <a:rPr lang="en-US" dirty="0"/>
+              <a:t>Intro to regression</a:t>
+            </a:r>
+          </a:p>
+        </p:txBody>
+      </p:sp>
+      <p:sp>
+        <p:nvSpPr>
+          <p:cNvPr id="8" name="Slide Number Placeholder 3"/>
+          <p:cNvSpPr>
+            <a:spLocks noGrp="1"/>
+          </p:cNvSpPr>
+          <p:nvPr>
+            <p:ph type="sldNum" sz="quarter" idx="13"/>
+          </p:nvPr>
+        </p:nvSpPr>
+        <p:spPr/>
+        <p:txBody>
+          <a:bodyPr/>
+          <a:lstStyle/>
+          <a:p>
+            <a:pPr>
+              <a:defRPr/>
+            </a:pPr>
+            <a:fld id="{BD5AD749-DAD1-6A4A-A2AA-CB20EAD0AEB7}" type="slidenum">
+              <a:rPr lang="en-US"/>
+              <a:pPr>
+                <a:defRPr/>
+              </a:pPr>
+              <a:t>45</a:t>
+            </a:fld>
+            <a:endParaRPr lang="en-US"/>
+          </a:p>
+        </p:txBody>
+      </p:sp>
+      <p:sp>
+        <p:nvSpPr>
+          <p:cNvPr id="9" name="TextBox 8"/>
+          <p:cNvSpPr txBox="1"/>
+          <p:nvPr/>
+        </p:nvSpPr>
+        <p:spPr>
+          <a:xfrm>
+            <a:off x="566737" y="952500"/>
+            <a:ext cx="8382000" cy="3323987"/>
+          </a:xfrm>
+          <a:prstGeom prst="rect">
+            <a:avLst/>
+          </a:prstGeom>
+          <a:noFill/>
+        </p:spPr>
+        <p:txBody>
+          <a:bodyPr wrap="square" rtlCol="0">
+            <a:spAutoFit/>
+          </a:bodyPr>
+          <a:lstStyle/>
+          <a:p>
+            <a:pPr algn="l"/>
+            <a:r>
+              <a:rPr lang="en-US" sz="3000" dirty="0" smtClean="0">
+                <a:latin typeface="PFDinTextCompPro-Italic"/>
+                <a:cs typeface="PFDinTextCompPro-Italic"/>
+              </a:rPr>
+              <a:t>Q: </a:t>
+            </a:r>
+            <a:r>
+              <a:rPr lang="en-US" sz="3000" dirty="0" smtClean="0">
+                <a:latin typeface="PFDinTextCompPro-Italic"/>
+                <a:cs typeface="PFDinTextCompPro-Italic"/>
+              </a:rPr>
+              <a:t>So, how do we select</a:t>
+            </a:r>
+            <a:r>
+              <a:rPr lang="en-US" sz="3000" dirty="0" smtClean="0">
+                <a:latin typeface="PFDinTextCompPro-Italic"/>
+                <a:cs typeface="PFDinTextCompPro-Italic"/>
+              </a:rPr>
+              <a:t> </a:t>
+            </a:r>
+            <a:r>
+              <a:rPr lang="en-US" sz="3000" dirty="0" smtClean="0">
+                <a:latin typeface="PFDinTextCompPro-Italic"/>
+                <a:cs typeface="PFDinTextCompPro-Italic"/>
+              </a:rPr>
+              <a:t>a linear regression model?</a:t>
+            </a:r>
+            <a:endParaRPr lang="en-US" sz="3000" dirty="0" smtClean="0">
+              <a:latin typeface="PFDinTextCompPro-Italic"/>
+              <a:cs typeface="PFDinTextCompPro-Italic"/>
+            </a:endParaRPr>
+          </a:p>
+          <a:p>
+            <a:pPr marL="457200" indent="-457200" algn="l">
+              <a:buFont typeface="Arial"/>
+              <a:buChar char="•"/>
+            </a:pPr>
+            <a:r>
+              <a:rPr lang="en-US" sz="3000" dirty="0" smtClean="0">
+                <a:latin typeface="PFDinTextCompPro-Italic"/>
+                <a:cs typeface="PFDinTextCompPro-Italic"/>
+              </a:rPr>
+              <a:t>Techniques for producing designs</a:t>
+            </a:r>
+          </a:p>
+          <a:p>
+            <a:pPr marL="785813" lvl="1" indent="-457200" algn="l">
+              <a:buFont typeface="Arial"/>
+              <a:buChar char="•"/>
+            </a:pPr>
+            <a:r>
+              <a:rPr lang="en-US" sz="3000" dirty="0" smtClean="0">
+                <a:latin typeface="PFDinTextCompPro-Italic"/>
+                <a:cs typeface="PFDinTextCompPro-Italic"/>
+              </a:rPr>
+              <a:t>Theory</a:t>
+            </a:r>
+          </a:p>
+          <a:p>
+            <a:pPr marL="785813" lvl="1" indent="-457200" algn="l">
+              <a:buFont typeface="Arial"/>
+              <a:buChar char="•"/>
+            </a:pPr>
+            <a:r>
+              <a:rPr lang="en-US" sz="3000" dirty="0" smtClean="0">
+                <a:latin typeface="PFDinTextCompPro-Italic"/>
+                <a:cs typeface="PFDinTextCompPro-Italic"/>
+              </a:rPr>
+              <a:t>Forward selection</a:t>
+            </a:r>
+          </a:p>
+          <a:p>
+            <a:pPr marL="785813" lvl="1" indent="-457200" algn="l">
+              <a:buFont typeface="Arial"/>
+              <a:buChar char="•"/>
+            </a:pPr>
+            <a:r>
+              <a:rPr lang="en-US" sz="3000" dirty="0" smtClean="0">
+                <a:latin typeface="PFDinTextCompPro-Italic"/>
+                <a:cs typeface="PFDinTextCompPro-Italic"/>
+              </a:rPr>
+              <a:t>Backward elimination</a:t>
+            </a:r>
+          </a:p>
+          <a:p>
+            <a:pPr marL="785813" lvl="1" indent="-457200" algn="l">
+              <a:buFont typeface="Arial"/>
+              <a:buChar char="•"/>
+            </a:pPr>
+            <a:r>
+              <a:rPr lang="en-US" sz="3000" dirty="0" smtClean="0">
+                <a:latin typeface="PFDinTextCompPro-Italic"/>
+                <a:cs typeface="PFDinTextCompPro-Italic"/>
+              </a:rPr>
+              <a:t>More</a:t>
+            </a:r>
+            <a:endParaRPr lang="en-US" sz="3000" dirty="0" smtClean="0">
+              <a:latin typeface="PFDinTextCompPro-Italic"/>
+              <a:cs typeface="PFDinTextCompPro-Italic"/>
+            </a:endParaRPr>
+          </a:p>
+          <a:p>
+            <a:pPr marL="457200" indent="-457200" algn="l">
+              <a:buFont typeface="Arial"/>
+              <a:buChar char="•"/>
+            </a:pPr>
+            <a:endParaRPr lang="en-US" sz="3000" dirty="0">
+              <a:latin typeface="PFDinTextCompPro-Italic"/>
+              <a:cs typeface="PFDinTextCompPro-Italic"/>
+            </a:endParaRPr>
+          </a:p>
+        </p:txBody>
+      </p:sp>
+    </p:spTree>
+    <p:extLst>
+      <p:ext uri="{BB962C8B-B14F-4D97-AF65-F5344CB8AC3E}">
+        <p14:creationId xmlns:p14="http://schemas.microsoft.com/office/powerpoint/2010/main" val="2449941988"/>
+      </p:ext>
+    </p:extLst>
+  </p:cSld>
+  <p:clrMapOvr>
+    <a:masterClrMapping/>
+  </p:clrMapOvr>
+  <p:transition xmlns:p14="http://schemas.microsoft.com/office/powerpoint/2010/main"/>
+  <p:timing>
+    <p:tnLst>
+      <p:par>
+        <p:cTn xmlns:p14="http://schemas.microsoft.com/office/powerpoint/2010/main" id="1" dur="indefinite" restart="never" nodeType="tmRoot"/>
+      </p:par>
+    </p:tnLst>
+  </p:timing>
+</p:sld>
+</file>
+
+<file path=ppt/slides/slide46.xml><?xml version="1.0" encoding="utf-8"?>
+<p:sld xmlns:a="http://schemas.openxmlformats.org/drawingml/2006/main" xmlns:r="http://schemas.openxmlformats.org/officeDocument/2006/relationships" xmlns:p="http://schemas.openxmlformats.org/presentationml/2006/main">
+  <p:cSld>
+    <p:spTree>
+      <p:nvGrpSpPr>
+        <p:cNvPr id="1" name=""/>
+        <p:cNvGrpSpPr/>
+        <p:nvPr/>
+      </p:nvGrpSpPr>
+      <p:grpSpPr>
+        <a:xfrm>
+          <a:off x="0" y="0"/>
+          <a:ext cx="0" cy="0"/>
+          <a:chOff x="0" y="0"/>
+          <a:chExt cx="0" cy="0"/>
+        </a:xfrm>
+      </p:grpSpPr>
+      <p:sp>
+        <p:nvSpPr>
+          <p:cNvPr id="4" name="Content Placeholder 3"/>
+          <p:cNvSpPr>
+            <a:spLocks noGrp="1"/>
+          </p:cNvSpPr>
+          <p:nvPr>
+            <p:ph sz="quarter" idx="11"/>
+          </p:nvPr>
+        </p:nvSpPr>
+        <p:spPr>
+          <a:xfrm>
+            <a:off x="414337" y="495300"/>
+            <a:ext cx="6400800" cy="304800"/>
+          </a:xfrm>
+        </p:spPr>
+        <p:txBody>
+          <a:bodyPr/>
+          <a:lstStyle/>
+          <a:p>
+            <a:pPr eaLnBrk="1" hangingPunct="1">
+              <a:lnSpc>
+                <a:spcPts val="2448"/>
+              </a:lnSpc>
+              <a:defRPr/>
+            </a:pPr>
+            <a:r>
+              <a:rPr lang="en-US" dirty="0"/>
+              <a:t>Intro to regression</a:t>
+            </a:r>
+          </a:p>
+        </p:txBody>
+      </p:sp>
+      <p:sp>
+        <p:nvSpPr>
+          <p:cNvPr id="8" name="Slide Number Placeholder 3"/>
+          <p:cNvSpPr>
+            <a:spLocks noGrp="1"/>
+          </p:cNvSpPr>
+          <p:nvPr>
+            <p:ph type="sldNum" sz="quarter" idx="13"/>
+          </p:nvPr>
+        </p:nvSpPr>
+        <p:spPr/>
+        <p:txBody>
+          <a:bodyPr/>
+          <a:lstStyle/>
+          <a:p>
+            <a:pPr>
+              <a:defRPr/>
+            </a:pPr>
+            <a:fld id="{BD5AD749-DAD1-6A4A-A2AA-CB20EAD0AEB7}" type="slidenum">
+              <a:rPr lang="en-US"/>
+              <a:pPr>
+                <a:defRPr/>
+              </a:pPr>
+              <a:t>46</a:t>
+            </a:fld>
+            <a:endParaRPr lang="en-US"/>
+          </a:p>
+        </p:txBody>
+      </p:sp>
+      <p:sp>
+        <p:nvSpPr>
+          <p:cNvPr id="9" name="TextBox 8"/>
+          <p:cNvSpPr txBox="1"/>
+          <p:nvPr/>
+        </p:nvSpPr>
+        <p:spPr>
+          <a:xfrm>
+            <a:off x="566737" y="952500"/>
+            <a:ext cx="8382000" cy="3785652"/>
+          </a:xfrm>
+          <a:prstGeom prst="rect">
+            <a:avLst/>
+          </a:prstGeom>
+          <a:noFill/>
+        </p:spPr>
+        <p:txBody>
+          <a:bodyPr wrap="square" rtlCol="0">
+            <a:spAutoFit/>
+          </a:bodyPr>
+          <a:lstStyle/>
+          <a:p>
+            <a:pPr algn="l"/>
+            <a:r>
+              <a:rPr lang="en-US" sz="3000" dirty="0" smtClean="0">
+                <a:latin typeface="PFDinTextCompPro-Italic"/>
+                <a:cs typeface="PFDinTextCompPro-Italic"/>
+              </a:rPr>
+              <a:t>Q: </a:t>
+            </a:r>
+            <a:r>
+              <a:rPr lang="en-US" sz="3000" dirty="0" smtClean="0">
+                <a:latin typeface="PFDinTextCompPro-Italic"/>
+                <a:cs typeface="PFDinTextCompPro-Italic"/>
+              </a:rPr>
+              <a:t>So, how do we select</a:t>
+            </a:r>
+            <a:r>
+              <a:rPr lang="en-US" sz="3000" dirty="0" smtClean="0">
+                <a:latin typeface="PFDinTextCompPro-Italic"/>
+                <a:cs typeface="PFDinTextCompPro-Italic"/>
+              </a:rPr>
+              <a:t> </a:t>
+            </a:r>
+            <a:r>
+              <a:rPr lang="en-US" sz="3000" dirty="0" smtClean="0">
+                <a:latin typeface="PFDinTextCompPro-Italic"/>
+                <a:cs typeface="PFDinTextCompPro-Italic"/>
+              </a:rPr>
+              <a:t>a linear regression model?</a:t>
+            </a:r>
+            <a:endParaRPr lang="en-US" sz="3000" dirty="0" smtClean="0">
+              <a:latin typeface="PFDinTextCompPro-Italic"/>
+              <a:cs typeface="PFDinTextCompPro-Italic"/>
+            </a:endParaRPr>
+          </a:p>
+          <a:p>
+            <a:pPr marL="457200" indent="-457200" algn="l">
+              <a:buFont typeface="Arial"/>
+              <a:buChar char="•"/>
+            </a:pPr>
+            <a:r>
+              <a:rPr lang="en-US" sz="3000" dirty="0" smtClean="0">
+                <a:latin typeface="PFDinTextCompPro-Italic"/>
+                <a:cs typeface="PFDinTextCompPro-Italic"/>
+              </a:rPr>
+              <a:t>Techniques for producing designs</a:t>
+            </a:r>
+          </a:p>
+          <a:p>
+            <a:pPr marL="785813" lvl="1" indent="-457200" algn="l">
+              <a:buFont typeface="Arial"/>
+              <a:buChar char="•"/>
+            </a:pPr>
+            <a:r>
+              <a:rPr lang="en-US" sz="3000" dirty="0" smtClean="0">
+                <a:latin typeface="PFDinTextCompPro-Italic"/>
+                <a:cs typeface="PFDinTextCompPro-Italic"/>
+              </a:rPr>
+              <a:t>Theory</a:t>
+            </a:r>
+          </a:p>
+          <a:p>
+            <a:pPr marL="785813" lvl="1" indent="-457200" algn="l">
+              <a:buFont typeface="Arial"/>
+              <a:buChar char="•"/>
+            </a:pPr>
+            <a:r>
+              <a:rPr lang="en-US" sz="3000" dirty="0" smtClean="0">
+                <a:latin typeface="PFDinTextCompPro-Italic"/>
+                <a:cs typeface="PFDinTextCompPro-Italic"/>
+              </a:rPr>
+              <a:t>Forward selection</a:t>
+            </a:r>
+          </a:p>
+          <a:p>
+            <a:pPr marL="785813" lvl="1" indent="-457200" algn="l">
+              <a:buFont typeface="Arial"/>
+              <a:buChar char="•"/>
+            </a:pPr>
+            <a:r>
+              <a:rPr lang="en-US" sz="3000" dirty="0" smtClean="0">
+                <a:latin typeface="PFDinTextCompPro-Italic"/>
+                <a:cs typeface="PFDinTextCompPro-Italic"/>
+              </a:rPr>
+              <a:t>Backward elimination</a:t>
+            </a:r>
+          </a:p>
+          <a:p>
+            <a:pPr marL="785813" lvl="1" indent="-457200" algn="l">
+              <a:buFont typeface="Arial"/>
+              <a:buChar char="•"/>
+            </a:pPr>
+            <a:r>
+              <a:rPr lang="en-US" sz="3000" dirty="0" smtClean="0">
+                <a:latin typeface="PFDinTextCompPro-Italic"/>
+                <a:cs typeface="PFDinTextCompPro-Italic"/>
+              </a:rPr>
+              <a:t>More</a:t>
+            </a:r>
+            <a:endParaRPr lang="en-US" sz="3000" dirty="0" smtClean="0">
+              <a:latin typeface="PFDinTextCompPro-Italic"/>
+              <a:cs typeface="PFDinTextCompPro-Italic"/>
+            </a:endParaRPr>
+          </a:p>
+          <a:p>
+            <a:pPr marL="457200" indent="-457200" algn="l">
+              <a:buFont typeface="Arial"/>
+              <a:buChar char="•"/>
+            </a:pPr>
+            <a:r>
+              <a:rPr lang="en-US" sz="3000" dirty="0" smtClean="0">
+                <a:latin typeface="PFDinTextCompPro-Italic"/>
+                <a:cs typeface="PFDinTextCompPro-Italic"/>
+              </a:rPr>
+              <a:t>Techniques for evaluating designs</a:t>
+            </a:r>
+          </a:p>
+          <a:p>
+            <a:pPr marL="457200" indent="-457200" algn="l">
+              <a:buFont typeface="Arial"/>
+              <a:buChar char="•"/>
+            </a:pPr>
+            <a:endParaRPr lang="en-US" sz="3000" dirty="0">
+              <a:latin typeface="PFDinTextCompPro-Italic"/>
+              <a:cs typeface="PFDinTextCompPro-Italic"/>
+            </a:endParaRPr>
+          </a:p>
+        </p:txBody>
+      </p:sp>
+    </p:spTree>
+    <p:extLst>
+      <p:ext uri="{BB962C8B-B14F-4D97-AF65-F5344CB8AC3E}">
+        <p14:creationId xmlns:p14="http://schemas.microsoft.com/office/powerpoint/2010/main" val="2449941988"/>
+      </p:ext>
+    </p:extLst>
+  </p:cSld>
+  <p:clrMapOvr>
+    <a:masterClrMapping/>
+  </p:clrMapOvr>
+  <p:transition xmlns:p14="http://schemas.microsoft.com/office/powerpoint/2010/main"/>
+  <p:timing>
+    <p:tnLst>
+      <p:par>
+        <p:cTn xmlns:p14="http://schemas.microsoft.com/office/powerpoint/2010/main" id="1" dur="indefinite" restart="never" nodeType="tmRoot"/>
+      </p:par>
+    </p:tnLst>
+  </p:timing>
+</p:sld>
+</file>
+
+<file path=ppt/slides/slide47.xml><?xml version="1.0" encoding="utf-8"?>
+<p:sld xmlns:a="http://schemas.openxmlformats.org/drawingml/2006/main" xmlns:r="http://schemas.openxmlformats.org/officeDocument/2006/relationships" xmlns:p="http://schemas.openxmlformats.org/presentationml/2006/main">
+  <p:cSld>
+    <p:spTree>
+      <p:nvGrpSpPr>
+        <p:cNvPr id="1" name=""/>
+        <p:cNvGrpSpPr/>
+        <p:nvPr/>
+      </p:nvGrpSpPr>
+      <p:grpSpPr>
+        <a:xfrm>
+          <a:off x="0" y="0"/>
+          <a:ext cx="0" cy="0"/>
+          <a:chOff x="0" y="0"/>
+          <a:chExt cx="0" cy="0"/>
+        </a:xfrm>
+      </p:grpSpPr>
+      <p:sp>
+        <p:nvSpPr>
+          <p:cNvPr id="4" name="Content Placeholder 3"/>
+          <p:cNvSpPr>
+            <a:spLocks noGrp="1"/>
+          </p:cNvSpPr>
+          <p:nvPr>
+            <p:ph sz="quarter" idx="11"/>
+          </p:nvPr>
+        </p:nvSpPr>
+        <p:spPr>
+          <a:xfrm>
+            <a:off x="414337" y="495300"/>
+            <a:ext cx="6400800" cy="304800"/>
+          </a:xfrm>
+        </p:spPr>
+        <p:txBody>
+          <a:bodyPr/>
+          <a:lstStyle/>
+          <a:p>
+            <a:pPr eaLnBrk="1" hangingPunct="1">
+              <a:lnSpc>
+                <a:spcPts val="2448"/>
+              </a:lnSpc>
+              <a:defRPr/>
+            </a:pPr>
+            <a:r>
+              <a:rPr lang="en-US" dirty="0"/>
+              <a:t>Intro to regression</a:t>
+            </a:r>
+          </a:p>
+        </p:txBody>
+      </p:sp>
+      <p:sp>
+        <p:nvSpPr>
+          <p:cNvPr id="8" name="Slide Number Placeholder 3"/>
+          <p:cNvSpPr>
+            <a:spLocks noGrp="1"/>
+          </p:cNvSpPr>
+          <p:nvPr>
+            <p:ph type="sldNum" sz="quarter" idx="13"/>
+          </p:nvPr>
+        </p:nvSpPr>
+        <p:spPr/>
+        <p:txBody>
+          <a:bodyPr/>
+          <a:lstStyle/>
+          <a:p>
+            <a:pPr>
+              <a:defRPr/>
+            </a:pPr>
+            <a:fld id="{BD5AD749-DAD1-6A4A-A2AA-CB20EAD0AEB7}" type="slidenum">
+              <a:rPr lang="en-US"/>
+              <a:pPr>
+                <a:defRPr/>
+              </a:pPr>
+              <a:t>47</a:t>
+            </a:fld>
+            <a:endParaRPr lang="en-US"/>
+          </a:p>
+        </p:txBody>
+      </p:sp>
+      <p:sp>
+        <p:nvSpPr>
+          <p:cNvPr id="9" name="TextBox 8"/>
+          <p:cNvSpPr txBox="1"/>
+          <p:nvPr/>
+        </p:nvSpPr>
+        <p:spPr>
+          <a:xfrm>
+            <a:off x="566737" y="952500"/>
+            <a:ext cx="8382000" cy="4247317"/>
+          </a:xfrm>
+          <a:prstGeom prst="rect">
+            <a:avLst/>
+          </a:prstGeom>
+          <a:noFill/>
+        </p:spPr>
+        <p:txBody>
+          <a:bodyPr wrap="square" rtlCol="0">
+            <a:spAutoFit/>
+          </a:bodyPr>
+          <a:lstStyle/>
+          <a:p>
+            <a:pPr algn="l"/>
+            <a:r>
+              <a:rPr lang="en-US" sz="3000" dirty="0" smtClean="0">
+                <a:latin typeface="PFDinTextCompPro-Italic"/>
+                <a:cs typeface="PFDinTextCompPro-Italic"/>
+              </a:rPr>
+              <a:t>Q: </a:t>
+            </a:r>
+            <a:r>
+              <a:rPr lang="en-US" sz="3000" dirty="0" smtClean="0">
+                <a:latin typeface="PFDinTextCompPro-Italic"/>
+                <a:cs typeface="PFDinTextCompPro-Italic"/>
+              </a:rPr>
+              <a:t>So, how do we select</a:t>
+            </a:r>
+            <a:r>
+              <a:rPr lang="en-US" sz="3000" dirty="0" smtClean="0">
+                <a:latin typeface="PFDinTextCompPro-Italic"/>
+                <a:cs typeface="PFDinTextCompPro-Italic"/>
+              </a:rPr>
+              <a:t> </a:t>
+            </a:r>
+            <a:r>
+              <a:rPr lang="en-US" sz="3000" dirty="0" smtClean="0">
+                <a:latin typeface="PFDinTextCompPro-Italic"/>
+                <a:cs typeface="PFDinTextCompPro-Italic"/>
+              </a:rPr>
+              <a:t>a linear regression model?</a:t>
+            </a:r>
+            <a:endParaRPr lang="en-US" sz="3000" dirty="0" smtClean="0">
+              <a:latin typeface="PFDinTextCompPro-Italic"/>
+              <a:cs typeface="PFDinTextCompPro-Italic"/>
+            </a:endParaRPr>
+          </a:p>
+          <a:p>
+            <a:pPr marL="457200" indent="-457200" algn="l">
+              <a:buFont typeface="Arial"/>
+              <a:buChar char="•"/>
+            </a:pPr>
+            <a:r>
+              <a:rPr lang="en-US" sz="3000" dirty="0" smtClean="0">
+                <a:latin typeface="PFDinTextCompPro-Italic"/>
+                <a:cs typeface="PFDinTextCompPro-Italic"/>
+              </a:rPr>
+              <a:t>Techniques for producing designs</a:t>
+            </a:r>
+          </a:p>
+          <a:p>
+            <a:pPr marL="785813" lvl="1" indent="-457200" algn="l">
+              <a:buFont typeface="Arial"/>
+              <a:buChar char="•"/>
+            </a:pPr>
+            <a:r>
+              <a:rPr lang="en-US" sz="3000" dirty="0" smtClean="0">
+                <a:latin typeface="PFDinTextCompPro-Italic"/>
+                <a:cs typeface="PFDinTextCompPro-Italic"/>
+              </a:rPr>
+              <a:t>Theory</a:t>
+            </a:r>
+          </a:p>
+          <a:p>
+            <a:pPr marL="785813" lvl="1" indent="-457200" algn="l">
+              <a:buFont typeface="Arial"/>
+              <a:buChar char="•"/>
+            </a:pPr>
+            <a:r>
+              <a:rPr lang="en-US" sz="3000" dirty="0" smtClean="0">
+                <a:latin typeface="PFDinTextCompPro-Italic"/>
+                <a:cs typeface="PFDinTextCompPro-Italic"/>
+              </a:rPr>
+              <a:t>Forward selection</a:t>
+            </a:r>
+          </a:p>
+          <a:p>
+            <a:pPr marL="785813" lvl="1" indent="-457200" algn="l">
+              <a:buFont typeface="Arial"/>
+              <a:buChar char="•"/>
+            </a:pPr>
+            <a:r>
+              <a:rPr lang="en-US" sz="3000" dirty="0" smtClean="0">
+                <a:latin typeface="PFDinTextCompPro-Italic"/>
+                <a:cs typeface="PFDinTextCompPro-Italic"/>
+              </a:rPr>
+              <a:t>Backward elimination</a:t>
+            </a:r>
+          </a:p>
+          <a:p>
+            <a:pPr marL="785813" lvl="1" indent="-457200" algn="l">
+              <a:buFont typeface="Arial"/>
+              <a:buChar char="•"/>
+            </a:pPr>
+            <a:r>
+              <a:rPr lang="en-US" sz="3000" dirty="0" smtClean="0">
+                <a:latin typeface="PFDinTextCompPro-Italic"/>
+                <a:cs typeface="PFDinTextCompPro-Italic"/>
+              </a:rPr>
+              <a:t>More</a:t>
+            </a:r>
+            <a:endParaRPr lang="en-US" sz="3000" dirty="0" smtClean="0">
+              <a:latin typeface="PFDinTextCompPro-Italic"/>
+              <a:cs typeface="PFDinTextCompPro-Italic"/>
+            </a:endParaRPr>
+          </a:p>
+          <a:p>
+            <a:pPr marL="457200" indent="-457200" algn="l">
+              <a:buFont typeface="Arial"/>
+              <a:buChar char="•"/>
+            </a:pPr>
+            <a:r>
+              <a:rPr lang="en-US" sz="3000" dirty="0" smtClean="0">
+                <a:latin typeface="PFDinTextCompPro-Italic"/>
+                <a:cs typeface="PFDinTextCompPro-Italic"/>
+              </a:rPr>
+              <a:t>Techniques for evaluating designs</a:t>
+            </a:r>
+          </a:p>
+          <a:p>
+            <a:pPr marL="785813" lvl="1" indent="-457200" algn="l">
+              <a:buFont typeface="Arial"/>
+              <a:buChar char="•"/>
+            </a:pPr>
+            <a:r>
+              <a:rPr lang="en-US" sz="3000" dirty="0" smtClean="0">
+                <a:latin typeface="PFDinTextCompPro-Italic"/>
+                <a:cs typeface="PFDinTextCompPro-Italic"/>
+              </a:rPr>
+              <a:t>Training metrics</a:t>
+            </a:r>
+          </a:p>
+          <a:p>
+            <a:pPr marL="457200" indent="-457200" algn="l">
+              <a:buFont typeface="Arial"/>
+              <a:buChar char="•"/>
+            </a:pPr>
+            <a:endParaRPr lang="en-US" sz="3000" dirty="0">
+              <a:latin typeface="PFDinTextCompPro-Italic"/>
+              <a:cs typeface="PFDinTextCompPro-Italic"/>
+            </a:endParaRPr>
+          </a:p>
+        </p:txBody>
+      </p:sp>
+    </p:spTree>
+    <p:extLst>
+      <p:ext uri="{BB962C8B-B14F-4D97-AF65-F5344CB8AC3E}">
+        <p14:creationId xmlns:p14="http://schemas.microsoft.com/office/powerpoint/2010/main" val="2449941988"/>
+      </p:ext>
+    </p:extLst>
+  </p:cSld>
+  <p:clrMapOvr>
+    <a:masterClrMapping/>
+  </p:clrMapOvr>
+  <p:transition xmlns:p14="http://schemas.microsoft.com/office/powerpoint/2010/main"/>
+  <p:timing>
+    <p:tnLst>
+      <p:par>
+        <p:cTn xmlns:p14="http://schemas.microsoft.com/office/powerpoint/2010/main" id="1" dur="indefinite" restart="never" nodeType="tmRoot"/>
+      </p:par>
+    </p:tnLst>
+  </p:timing>
+</p:sld>
+</file>
+
+<file path=ppt/slides/slide48.xml><?xml version="1.0" encoding="utf-8"?>
+<p:sld xmlns:a="http://schemas.openxmlformats.org/drawingml/2006/main" xmlns:r="http://schemas.openxmlformats.org/officeDocument/2006/relationships" xmlns:p="http://schemas.openxmlformats.org/presentationml/2006/main">
+  <p:cSld>
+    <p:spTree>
+      <p:nvGrpSpPr>
+        <p:cNvPr id="1" name=""/>
+        <p:cNvGrpSpPr/>
+        <p:nvPr/>
+      </p:nvGrpSpPr>
+      <p:grpSpPr>
+        <a:xfrm>
+          <a:off x="0" y="0"/>
+          <a:ext cx="0" cy="0"/>
+          <a:chOff x="0" y="0"/>
+          <a:chExt cx="0" cy="0"/>
+        </a:xfrm>
+      </p:grpSpPr>
+      <p:sp>
+        <p:nvSpPr>
+          <p:cNvPr id="4" name="Content Placeholder 3"/>
+          <p:cNvSpPr>
+            <a:spLocks noGrp="1"/>
+          </p:cNvSpPr>
+          <p:nvPr>
+            <p:ph sz="quarter" idx="11"/>
+          </p:nvPr>
+        </p:nvSpPr>
+        <p:spPr>
+          <a:xfrm>
+            <a:off x="414337" y="495300"/>
+            <a:ext cx="6400800" cy="304800"/>
+          </a:xfrm>
+        </p:spPr>
+        <p:txBody>
+          <a:bodyPr/>
+          <a:lstStyle/>
+          <a:p>
+            <a:pPr eaLnBrk="1" hangingPunct="1">
+              <a:lnSpc>
+                <a:spcPts val="2448"/>
+              </a:lnSpc>
+              <a:defRPr/>
+            </a:pPr>
+            <a:r>
+              <a:rPr lang="en-US" dirty="0"/>
+              <a:t>Intro to regression</a:t>
+            </a:r>
+          </a:p>
+        </p:txBody>
+      </p:sp>
+      <p:sp>
+        <p:nvSpPr>
+          <p:cNvPr id="8" name="Slide Number Placeholder 3"/>
+          <p:cNvSpPr>
+            <a:spLocks noGrp="1"/>
+          </p:cNvSpPr>
+          <p:nvPr>
+            <p:ph type="sldNum" sz="quarter" idx="13"/>
+          </p:nvPr>
+        </p:nvSpPr>
+        <p:spPr/>
+        <p:txBody>
+          <a:bodyPr/>
+          <a:lstStyle/>
+          <a:p>
+            <a:pPr>
+              <a:defRPr/>
+            </a:pPr>
+            <a:fld id="{BD5AD749-DAD1-6A4A-A2AA-CB20EAD0AEB7}" type="slidenum">
+              <a:rPr lang="en-US"/>
+              <a:pPr>
+                <a:defRPr/>
+              </a:pPr>
+              <a:t>48</a:t>
+            </a:fld>
+            <a:endParaRPr lang="en-US"/>
+          </a:p>
+        </p:txBody>
+      </p:sp>
+      <p:sp>
+        <p:nvSpPr>
+          <p:cNvPr id="9" name="TextBox 8"/>
+          <p:cNvSpPr txBox="1"/>
+          <p:nvPr/>
+        </p:nvSpPr>
+        <p:spPr>
+          <a:xfrm>
+            <a:off x="566737" y="952500"/>
+            <a:ext cx="8382000" cy="4708981"/>
+          </a:xfrm>
+          <a:prstGeom prst="rect">
+            <a:avLst/>
+          </a:prstGeom>
+          <a:noFill/>
+        </p:spPr>
+        <p:txBody>
+          <a:bodyPr wrap="square" rtlCol="0">
+            <a:spAutoFit/>
+          </a:bodyPr>
+          <a:lstStyle/>
+          <a:p>
+            <a:pPr algn="l"/>
+            <a:r>
+              <a:rPr lang="en-US" sz="3000" dirty="0" smtClean="0">
+                <a:latin typeface="PFDinTextCompPro-Italic"/>
+                <a:cs typeface="PFDinTextCompPro-Italic"/>
+              </a:rPr>
+              <a:t>Q: </a:t>
+            </a:r>
+            <a:r>
+              <a:rPr lang="en-US" sz="3000" dirty="0" smtClean="0">
+                <a:latin typeface="PFDinTextCompPro-Italic"/>
+                <a:cs typeface="PFDinTextCompPro-Italic"/>
+              </a:rPr>
+              <a:t>So, how do we select</a:t>
+            </a:r>
+            <a:r>
+              <a:rPr lang="en-US" sz="3000" dirty="0" smtClean="0">
+                <a:latin typeface="PFDinTextCompPro-Italic"/>
+                <a:cs typeface="PFDinTextCompPro-Italic"/>
+              </a:rPr>
+              <a:t> </a:t>
+            </a:r>
+            <a:r>
+              <a:rPr lang="en-US" sz="3000" dirty="0" smtClean="0">
+                <a:latin typeface="PFDinTextCompPro-Italic"/>
+                <a:cs typeface="PFDinTextCompPro-Italic"/>
+              </a:rPr>
+              <a:t>a linear regression model?</a:t>
+            </a:r>
+            <a:endParaRPr lang="en-US" sz="3000" dirty="0" smtClean="0">
+              <a:latin typeface="PFDinTextCompPro-Italic"/>
+              <a:cs typeface="PFDinTextCompPro-Italic"/>
+            </a:endParaRPr>
+          </a:p>
+          <a:p>
+            <a:pPr marL="457200" indent="-457200" algn="l">
+              <a:buFont typeface="Arial"/>
+              <a:buChar char="•"/>
+            </a:pPr>
+            <a:r>
+              <a:rPr lang="en-US" sz="3000" dirty="0" smtClean="0">
+                <a:latin typeface="PFDinTextCompPro-Italic"/>
+                <a:cs typeface="PFDinTextCompPro-Italic"/>
+              </a:rPr>
+              <a:t>Techniques for producing designs</a:t>
+            </a:r>
+          </a:p>
+          <a:p>
+            <a:pPr marL="785813" lvl="1" indent="-457200" algn="l">
+              <a:buFont typeface="Arial"/>
+              <a:buChar char="•"/>
+            </a:pPr>
+            <a:r>
+              <a:rPr lang="en-US" sz="3000" dirty="0" smtClean="0">
+                <a:latin typeface="PFDinTextCompPro-Italic"/>
+                <a:cs typeface="PFDinTextCompPro-Italic"/>
+              </a:rPr>
+              <a:t>Theory</a:t>
+            </a:r>
+          </a:p>
+          <a:p>
+            <a:pPr marL="785813" lvl="1" indent="-457200" algn="l">
+              <a:buFont typeface="Arial"/>
+              <a:buChar char="•"/>
+            </a:pPr>
+            <a:r>
+              <a:rPr lang="en-US" sz="3000" dirty="0" smtClean="0">
+                <a:latin typeface="PFDinTextCompPro-Italic"/>
+                <a:cs typeface="PFDinTextCompPro-Italic"/>
+              </a:rPr>
+              <a:t>Forward selection</a:t>
+            </a:r>
+          </a:p>
+          <a:p>
+            <a:pPr marL="785813" lvl="1" indent="-457200" algn="l">
+              <a:buFont typeface="Arial"/>
+              <a:buChar char="•"/>
+            </a:pPr>
+            <a:r>
+              <a:rPr lang="en-US" sz="3000" dirty="0" smtClean="0">
+                <a:latin typeface="PFDinTextCompPro-Italic"/>
+                <a:cs typeface="PFDinTextCompPro-Italic"/>
+              </a:rPr>
+              <a:t>Backward elimination</a:t>
+            </a:r>
+          </a:p>
+          <a:p>
+            <a:pPr marL="785813" lvl="1" indent="-457200" algn="l">
+              <a:buFont typeface="Arial"/>
+              <a:buChar char="•"/>
+            </a:pPr>
+            <a:r>
+              <a:rPr lang="en-US" sz="3000" dirty="0" smtClean="0">
+                <a:latin typeface="PFDinTextCompPro-Italic"/>
+                <a:cs typeface="PFDinTextCompPro-Italic"/>
+              </a:rPr>
+              <a:t>More</a:t>
+            </a:r>
+            <a:endParaRPr lang="en-US" sz="3000" dirty="0" smtClean="0">
+              <a:latin typeface="PFDinTextCompPro-Italic"/>
+              <a:cs typeface="PFDinTextCompPro-Italic"/>
+            </a:endParaRPr>
+          </a:p>
+          <a:p>
+            <a:pPr marL="457200" indent="-457200" algn="l">
+              <a:buFont typeface="Arial"/>
+              <a:buChar char="•"/>
+            </a:pPr>
+            <a:r>
+              <a:rPr lang="en-US" sz="3000" dirty="0" smtClean="0">
+                <a:latin typeface="PFDinTextCompPro-Italic"/>
+                <a:cs typeface="PFDinTextCompPro-Italic"/>
+              </a:rPr>
+              <a:t>Techniques for evaluating designs</a:t>
+            </a:r>
+          </a:p>
+          <a:p>
+            <a:pPr marL="785813" lvl="1" indent="-457200" algn="l">
+              <a:buFont typeface="Arial"/>
+              <a:buChar char="•"/>
+            </a:pPr>
+            <a:r>
+              <a:rPr lang="en-US" sz="3000" dirty="0" smtClean="0">
+                <a:latin typeface="PFDinTextCompPro-Italic"/>
+                <a:cs typeface="PFDinTextCompPro-Italic"/>
+              </a:rPr>
+              <a:t>Training metrics</a:t>
+            </a:r>
+          </a:p>
+          <a:p>
+            <a:pPr marL="785813" lvl="1" indent="-457200" algn="l">
+              <a:buFont typeface="Arial"/>
+              <a:buChar char="•"/>
+            </a:pPr>
+            <a:r>
+              <a:rPr lang="en-US" sz="3000" dirty="0" smtClean="0">
+                <a:latin typeface="PFDinTextCompPro-Italic"/>
+                <a:cs typeface="PFDinTextCompPro-Italic"/>
+              </a:rPr>
+              <a:t>Test set performance / Cross-validation</a:t>
+            </a:r>
+          </a:p>
+          <a:p>
+            <a:pPr marL="457200" indent="-457200" algn="l">
+              <a:buFont typeface="Arial"/>
+              <a:buChar char="•"/>
+            </a:pPr>
+            <a:endParaRPr lang="en-US" sz="3000" dirty="0">
+              <a:latin typeface="PFDinTextCompPro-Italic"/>
+              <a:cs typeface="PFDinTextCompPro-Italic"/>
+            </a:endParaRPr>
+          </a:p>
+        </p:txBody>
+      </p:sp>
+    </p:spTree>
+    <p:extLst>
+      <p:ext uri="{BB962C8B-B14F-4D97-AF65-F5344CB8AC3E}">
+        <p14:creationId xmlns:p14="http://schemas.microsoft.com/office/powerpoint/2010/main" val="2449941988"/>
+      </p:ext>
+    </p:extLst>
+  </p:cSld>
+  <p:clrMapOvr>
+    <a:masterClrMapping/>
+  </p:clrMapOvr>
+  <p:transition xmlns:p14="http://schemas.microsoft.com/office/powerpoint/2010/main"/>
+  <p:timing>
+    <p:tnLst>
+      <p:par>
+        <p:cTn xmlns:p14="http://schemas.microsoft.com/office/powerpoint/2010/main" id="1" dur="indefinite" restart="never" nodeType="tmRoot"/>
+      </p:par>
+    </p:tnLst>
+  </p:timing>
+</p:sld>
+</file>
+
+<file path=ppt/slides/slide49.xml><?xml version="1.0" encoding="utf-8"?>
 <p:sld xmlns:a="http://schemas.openxmlformats.org/drawingml/2006/main" xmlns:r="http://schemas.openxmlformats.org/officeDocument/2006/relationships" xmlns:p="http://schemas.openxmlformats.org/presentationml/2006/main">
   <p:cSld>
     <p:spTree>

</xml_diff>